<commit_message>
Almost done with the slide deck, also added application lifecycles Visio for traditional and SPA web apps
</commit_message>
<xml_diff>
--- a/intro-to-angular-js.pptx
+++ b/intro-to-angular-js.pptx
@@ -5,15 +5,21 @@
     <p:sldMasterId id="2147483828" r:id="rId1"/>
   </p:sldMasterIdLst>
   <p:notesMasterIdLst>
-    <p:notesMasterId r:id="rId8"/>
+    <p:notesMasterId r:id="rId14"/>
   </p:notesMasterIdLst>
   <p:sldIdLst>
     <p:sldId id="256" r:id="rId2"/>
     <p:sldId id="257" r:id="rId3"/>
-    <p:sldId id="258" r:id="rId4"/>
-    <p:sldId id="259" r:id="rId5"/>
-    <p:sldId id="260" r:id="rId6"/>
-    <p:sldId id="261" r:id="rId7"/>
+    <p:sldId id="264" r:id="rId4"/>
+    <p:sldId id="265" r:id="rId5"/>
+    <p:sldId id="262" r:id="rId6"/>
+    <p:sldId id="263" r:id="rId7"/>
+    <p:sldId id="267" r:id="rId8"/>
+    <p:sldId id="258" r:id="rId9"/>
+    <p:sldId id="259" r:id="rId10"/>
+    <p:sldId id="260" r:id="rId11"/>
+    <p:sldId id="266" r:id="rId12"/>
+    <p:sldId id="261" r:id="rId13"/>
   </p:sldIdLst>
   <p:sldSz cx="9144000" cy="6858000" type="screen4x3"/>
   <p:notesSz cx="6858000" cy="9144000"/>
@@ -367,7 +373,7 @@
     </p:spTree>
     <p:extLst>
       <p:ext uri="{BB962C8B-B14F-4D97-AF65-F5344CB8AC3E}">
-        <p14:creationId xmlns:p14="http://schemas.microsoft.com/office/powerpoint/2010/main" xmlns="" val="2181301"/>
+        <p14:creationId xmlns="" xmlns:p14="http://schemas.microsoft.com/office/powerpoint/2010/main" val="2181301"/>
       </p:ext>
     </p:extLst>
   </p:cSld>
@@ -467,6 +473,116 @@
 </p:notesMaster>
 </file>
 
+<file path=ppt/notesSlides/notesSlide1.xml><?xml version="1.0" encoding="utf-8"?>
+<p:notes xmlns:a="http://schemas.openxmlformats.org/drawingml/2006/main" xmlns:r="http://schemas.openxmlformats.org/officeDocument/2006/relationships" xmlns:p="http://schemas.openxmlformats.org/presentationml/2006/main">
+  <p:cSld>
+    <p:spTree>
+      <p:nvGrpSpPr>
+        <p:cNvPr id="1" name=""/>
+        <p:cNvGrpSpPr/>
+        <p:nvPr/>
+      </p:nvGrpSpPr>
+      <p:grpSpPr>
+        <a:xfrm>
+          <a:off x="0" y="0"/>
+          <a:ext cx="0" cy="0"/>
+          <a:chOff x="0" y="0"/>
+          <a:chExt cx="0" cy="0"/>
+        </a:xfrm>
+      </p:grpSpPr>
+      <p:sp>
+        <p:nvSpPr>
+          <p:cNvPr id="2" name="Slide Image Placeholder 1"/>
+          <p:cNvSpPr>
+            <a:spLocks noGrp="1" noRot="1" noChangeAspect="1"/>
+          </p:cNvSpPr>
+          <p:nvPr>
+            <p:ph type="sldImg"/>
+          </p:nvPr>
+        </p:nvSpPr>
+        <p:spPr/>
+      </p:sp>
+      <p:sp>
+        <p:nvSpPr>
+          <p:cNvPr id="3" name="Notes Placeholder 2"/>
+          <p:cNvSpPr>
+            <a:spLocks noGrp="1"/>
+          </p:cNvSpPr>
+          <p:nvPr>
+            <p:ph type="body" idx="1"/>
+          </p:nvPr>
+        </p:nvSpPr>
+        <p:spPr/>
+        <p:txBody>
+          <a:bodyPr>
+            <a:normAutofit/>
+          </a:bodyPr>
+          <a:lstStyle/>
+          <a:p>
+            <a:pPr>
+              <a:buFont typeface="Arial" pitchFamily="34" charset="0"/>
+              <a:buChar char="•"/>
+            </a:pPr>
+            <a:r>
+              <a:rPr lang="en-US" dirty="0" smtClean="0"/>
+              <a:t>Discuss documentation that can be found there</a:t>
+            </a:r>
+          </a:p>
+          <a:p>
+            <a:pPr>
+              <a:buFont typeface="Arial" pitchFamily="34" charset="0"/>
+              <a:buChar char="•"/>
+            </a:pPr>
+            <a:r>
+              <a:rPr lang="en-US" dirty="0" smtClean="0"/>
+              <a:t>Talk about difficulties caused by documentation using SPA “buzzwords”</a:t>
+            </a:r>
+          </a:p>
+          <a:p>
+            <a:pPr>
+              <a:buFont typeface="Arial" pitchFamily="34" charset="0"/>
+              <a:buChar char="•"/>
+            </a:pPr>
+            <a:r>
+              <a:rPr lang="en-US" dirty="0" smtClean="0"/>
+              <a:t>Throw away preconceptions of how web apps work, once you understand the concepts Angular becomes WAY easier</a:t>
+            </a:r>
+            <a:endParaRPr lang="en-US" dirty="0"/>
+          </a:p>
+        </p:txBody>
+      </p:sp>
+      <p:sp>
+        <p:nvSpPr>
+          <p:cNvPr id="4" name="Slide Number Placeholder 3"/>
+          <p:cNvSpPr>
+            <a:spLocks noGrp="1"/>
+          </p:cNvSpPr>
+          <p:nvPr>
+            <p:ph type="sldNum" sz="quarter" idx="10"/>
+          </p:nvPr>
+        </p:nvSpPr>
+        <p:spPr/>
+        <p:txBody>
+          <a:bodyPr/>
+          <a:lstStyle/>
+          <a:p>
+            <a:fld id="{2714D6BF-4717-4189-A1EF-ED5088F1B30B}" type="slidenum">
+              <a:rPr lang="en-US" smtClean="0"/>
+              <a:pPr/>
+              <a:t>9</a:t>
+            </a:fld>
+            <a:endParaRPr lang="en-US"/>
+          </a:p>
+        </p:txBody>
+      </p:sp>
+    </p:spTree>
+  </p:cSld>
+  <p:clrMapOvr>
+    <a:masterClrMapping/>
+  </p:clrMapOvr>
+</p:notes>
+</file>
+
 <file path=ppt/slideLayouts/slideLayout1.xml><?xml version="1.0" encoding="utf-8"?>
 <p:sldLayout xmlns:a="http://schemas.openxmlformats.org/drawingml/2006/main" xmlns:r="http://schemas.openxmlformats.org/officeDocument/2006/relationships" xmlns:p="http://schemas.openxmlformats.org/presentationml/2006/main" showMasterSp="0" type="title" preserve="1">
   <p:cSld name="Title Slide">
@@ -839,43 +955,70 @@
         <p:txBody>
           <a:bodyPr/>
           <a:lstStyle>
+            <a:lvl1pPr>
+              <a:buSzPct val="100000"/>
+              <a:buFont typeface="Segoe UI" pitchFamily="34" charset="0"/>
+              <a:buChar char="‐"/>
+              <a:defRPr/>
+            </a:lvl1pPr>
+            <a:lvl2pPr>
+              <a:buSzPct val="100000"/>
+              <a:buFont typeface="Arial" pitchFamily="34" charset="0"/>
+              <a:buChar char="•"/>
+              <a:defRPr/>
+            </a:lvl2pPr>
+            <a:lvl3pPr>
+              <a:buFont typeface="Courier New" pitchFamily="49" charset="0"/>
+              <a:buNone/>
+              <a:defRPr/>
+            </a:lvl3pPr>
+            <a:lvl4pPr>
+              <a:buFont typeface="Arial" pitchFamily="34" charset="0"/>
+              <a:buNone/>
+              <a:defRPr/>
+            </a:lvl4pPr>
+            <a:lvl5pPr>
+              <a:buFont typeface="Arial" pitchFamily="34" charset="0"/>
+              <a:buNone/>
+              <a:defRPr/>
+            </a:lvl5pPr>
             <a:extLst/>
           </a:lstStyle>
           <a:p>
             <a:pPr lvl="0" eaLnBrk="1" latinLnBrk="0" hangingPunct="1"/>
             <a:r>
-              <a:rPr lang="en-US" smtClean="0"/>
+              <a:rPr lang="en-US" dirty="0" smtClean="0"/>
               <a:t>Click to edit Master text styles</a:t>
             </a:r>
           </a:p>
           <a:p>
             <a:pPr lvl="1" eaLnBrk="1" latinLnBrk="0" hangingPunct="1"/>
             <a:r>
-              <a:rPr lang="en-US" smtClean="0"/>
+              <a:rPr lang="en-US" dirty="0" smtClean="0"/>
               <a:t>Second level</a:t>
             </a:r>
           </a:p>
           <a:p>
             <a:pPr lvl="2" eaLnBrk="1" latinLnBrk="0" hangingPunct="1"/>
             <a:r>
-              <a:rPr lang="en-US" smtClean="0"/>
+              <a:rPr lang="en-US" dirty="0" smtClean="0"/>
               <a:t>Third level</a:t>
             </a:r>
           </a:p>
           <a:p>
             <a:pPr lvl="3" eaLnBrk="1" latinLnBrk="0" hangingPunct="1"/>
             <a:r>
-              <a:rPr lang="en-US" smtClean="0"/>
+              <a:rPr lang="en-US" dirty="0" smtClean="0"/>
               <a:t>Fourth level</a:t>
             </a:r>
           </a:p>
           <a:p>
             <a:pPr lvl="4" eaLnBrk="1" latinLnBrk="0" hangingPunct="1"/>
             <a:r>
-              <a:rPr lang="en-US" smtClean="0"/>
+              <a:rPr lang="en-US" dirty="0" smtClean="0"/>
               <a:t>Fifth level</a:t>
             </a:r>
-            <a:endParaRPr kumimoji="0" lang="en-US"/>
+            <a:endParaRPr kumimoji="0" lang="en-US" dirty="0"/>
           </a:p>
         </p:txBody>
       </p:sp>
@@ -2576,7 +2719,11 @@
           <a:p>
             <a:r>
               <a:rPr lang="en-US" dirty="0" smtClean="0"/>
-              <a:t>Guardian, BTS Disability (BRO)</a:t>
+              <a:t>Guardian, BTS Disability (BRO</a:t>
+            </a:r>
+            <a:r>
+              <a:rPr lang="en-US" dirty="0" smtClean="0"/>
+              <a:t>)</a:t>
             </a:r>
             <a:endParaRPr lang="en-US" dirty="0" smtClean="0"/>
           </a:p>
@@ -2588,9 +2735,602 @@
     </p:spTree>
     <p:extLst>
       <p:ext uri="{BB962C8B-B14F-4D97-AF65-F5344CB8AC3E}">
-        <p14:creationId xmlns:p14="http://schemas.microsoft.com/office/powerpoint/2010/main" xmlns="" val="2379396099"/>
+        <p14:creationId xmlns="" xmlns:p14="http://schemas.microsoft.com/office/powerpoint/2010/main" val="2379396099"/>
       </p:ext>
     </p:extLst>
+  </p:cSld>
+  <p:clrMapOvr>
+    <a:masterClrMapping/>
+  </p:clrMapOvr>
+  <p:timing>
+    <p:tnLst>
+      <p:par>
+        <p:cTn id="1" dur="indefinite" restart="never" nodeType="tmRoot"/>
+      </p:par>
+    </p:tnLst>
+  </p:timing>
+</p:sld>
+</file>
+
+<file path=ppt/slides/slide10.xml><?xml version="1.0" encoding="utf-8"?>
+<p:sld xmlns:a="http://schemas.openxmlformats.org/drawingml/2006/main" xmlns:r="http://schemas.openxmlformats.org/officeDocument/2006/relationships" xmlns:p="http://schemas.openxmlformats.org/presentationml/2006/main">
+  <p:cSld>
+    <p:spTree>
+      <p:nvGrpSpPr>
+        <p:cNvPr id="1" name=""/>
+        <p:cNvGrpSpPr/>
+        <p:nvPr/>
+      </p:nvGrpSpPr>
+      <p:grpSpPr>
+        <a:xfrm>
+          <a:off x="0" y="0"/>
+          <a:ext cx="0" cy="0"/>
+          <a:chOff x="0" y="0"/>
+          <a:chExt cx="0" cy="0"/>
+        </a:xfrm>
+      </p:grpSpPr>
+      <p:sp>
+        <p:nvSpPr>
+          <p:cNvPr id="2" name="Content Placeholder 1"/>
+          <p:cNvSpPr>
+            <a:spLocks noGrp="1"/>
+          </p:cNvSpPr>
+          <p:nvPr>
+            <p:ph idx="1"/>
+          </p:nvPr>
+        </p:nvSpPr>
+        <p:spPr/>
+        <p:txBody>
+          <a:bodyPr/>
+          <a:lstStyle/>
+          <a:p>
+            <a:r>
+              <a:rPr lang="en-US" smtClean="0"/>
+              <a:t>Application structure/Initialization</a:t>
+            </a:r>
+          </a:p>
+          <a:p>
+            <a:r>
+              <a:rPr lang="en-US" smtClean="0"/>
+              <a:t>Modules</a:t>
+            </a:r>
+          </a:p>
+          <a:p>
+            <a:r>
+              <a:rPr lang="en-US" smtClean="0"/>
+              <a:t>Dependency Injection</a:t>
+            </a:r>
+          </a:p>
+          <a:p>
+            <a:r>
+              <a:rPr lang="en-US" smtClean="0"/>
+              <a:t>Routing/State Management</a:t>
+            </a:r>
+          </a:p>
+          <a:p>
+            <a:r>
+              <a:rPr lang="en-US" smtClean="0"/>
+              <a:t>Controllers</a:t>
+            </a:r>
+          </a:p>
+          <a:p>
+            <a:r>
+              <a:rPr lang="en-US" smtClean="0"/>
+              <a:t>Views</a:t>
+            </a:r>
+          </a:p>
+          <a:p>
+            <a:r>
+              <a:rPr lang="en-US" smtClean="0"/>
+              <a:t>Scope</a:t>
+            </a:r>
+          </a:p>
+          <a:p>
+            <a:r>
+              <a:rPr lang="en-US" smtClean="0"/>
+              <a:t>Data-Binding</a:t>
+            </a:r>
+          </a:p>
+          <a:p>
+            <a:r>
+              <a:rPr lang="en-US" smtClean="0"/>
+              <a:t>Services</a:t>
+            </a:r>
+          </a:p>
+          <a:p>
+            <a:endParaRPr lang="en-US" dirty="0"/>
+          </a:p>
+        </p:txBody>
+      </p:sp>
+      <p:sp>
+        <p:nvSpPr>
+          <p:cNvPr id="3" name="Title 2"/>
+          <p:cNvSpPr>
+            <a:spLocks noGrp="1"/>
+          </p:cNvSpPr>
+          <p:nvPr>
+            <p:ph type="title"/>
+          </p:nvPr>
+        </p:nvSpPr>
+        <p:spPr/>
+        <p:txBody>
+          <a:bodyPr/>
+          <a:lstStyle/>
+          <a:p>
+            <a:r>
+              <a:rPr lang="en-US" smtClean="0"/>
+              <a:t>Key Concepts</a:t>
+            </a:r>
+            <a:endParaRPr lang="en-US" dirty="0"/>
+          </a:p>
+        </p:txBody>
+      </p:sp>
+      <p:sp>
+        <p:nvSpPr>
+          <p:cNvPr id="4" name="Date Placeholder 3"/>
+          <p:cNvSpPr>
+            <a:spLocks noGrp="1"/>
+          </p:cNvSpPr>
+          <p:nvPr>
+            <p:ph type="dt" sz="half" idx="2"/>
+          </p:nvPr>
+        </p:nvSpPr>
+        <p:spPr/>
+        <p:txBody>
+          <a:bodyPr/>
+          <a:lstStyle/>
+          <a:p>
+            <a:r>
+              <a:rPr lang="en-US" smtClean="0"/>
+              <a:t>May 7, 2014</a:t>
+            </a:r>
+            <a:endParaRPr lang="en-US"/>
+          </a:p>
+        </p:txBody>
+      </p:sp>
+      <p:sp>
+        <p:nvSpPr>
+          <p:cNvPr id="5" name="Footer Placeholder 4"/>
+          <p:cNvSpPr>
+            <a:spLocks noGrp="1"/>
+          </p:cNvSpPr>
+          <p:nvPr>
+            <p:ph type="ftr" sz="quarter" idx="3"/>
+          </p:nvPr>
+        </p:nvSpPr>
+        <p:spPr/>
+        <p:txBody>
+          <a:bodyPr/>
+          <a:lstStyle/>
+          <a:p>
+            <a:r>
+              <a:rPr lang="en-US" smtClean="0"/>
+              <a:t>2014 Guardian Software Developer Conference </a:t>
+            </a:r>
+            <a:endParaRPr lang="en-US" dirty="0"/>
+          </a:p>
+        </p:txBody>
+      </p:sp>
+      <p:sp>
+        <p:nvSpPr>
+          <p:cNvPr id="6" name="Slide Number Placeholder 5"/>
+          <p:cNvSpPr>
+            <a:spLocks noGrp="1"/>
+          </p:cNvSpPr>
+          <p:nvPr>
+            <p:ph type="sldNum" sz="quarter" idx="4"/>
+          </p:nvPr>
+        </p:nvSpPr>
+        <p:spPr/>
+        <p:txBody>
+          <a:bodyPr/>
+          <a:lstStyle/>
+          <a:p>
+            <a:fld id="{24A51D8B-51BA-45F9-A651-4243A6A9861C}" type="slidenum">
+              <a:rPr lang="en-US" smtClean="0"/>
+              <a:pPr/>
+              <a:t>10</a:t>
+            </a:fld>
+            <a:endParaRPr lang="en-US" dirty="0"/>
+          </a:p>
+        </p:txBody>
+      </p:sp>
+    </p:spTree>
+  </p:cSld>
+  <p:clrMapOvr>
+    <a:masterClrMapping/>
+  </p:clrMapOvr>
+  <p:timing>
+    <p:tnLst>
+      <p:par>
+        <p:cTn id="1" dur="indefinite" restart="never" nodeType="tmRoot"/>
+      </p:par>
+    </p:tnLst>
+  </p:timing>
+</p:sld>
+</file>
+
+<file path=ppt/slides/slide11.xml><?xml version="1.0" encoding="utf-8"?>
+<p:sld xmlns:a="http://schemas.openxmlformats.org/drawingml/2006/main" xmlns:r="http://schemas.openxmlformats.org/officeDocument/2006/relationships" xmlns:p="http://schemas.openxmlformats.org/presentationml/2006/main">
+  <p:cSld>
+    <p:spTree>
+      <p:nvGrpSpPr>
+        <p:cNvPr id="1" name=""/>
+        <p:cNvGrpSpPr/>
+        <p:nvPr/>
+      </p:nvGrpSpPr>
+      <p:grpSpPr>
+        <a:xfrm>
+          <a:off x="0" y="0"/>
+          <a:ext cx="0" cy="0"/>
+          <a:chOff x="0" y="0"/>
+          <a:chExt cx="0" cy="0"/>
+        </a:xfrm>
+      </p:grpSpPr>
+      <p:sp>
+        <p:nvSpPr>
+          <p:cNvPr id="2" name="Content Placeholder 1"/>
+          <p:cNvSpPr>
+            <a:spLocks noGrp="1"/>
+          </p:cNvSpPr>
+          <p:nvPr>
+            <p:ph idx="1"/>
+          </p:nvPr>
+        </p:nvSpPr>
+        <p:spPr/>
+        <p:txBody>
+          <a:bodyPr anchor="t"/>
+          <a:lstStyle/>
+          <a:p>
+            <a:pPr algn="ctr"/>
+            <a:endParaRPr lang="en-US" dirty="0" smtClean="0"/>
+          </a:p>
+          <a:p>
+            <a:pPr algn="ctr"/>
+            <a:endParaRPr lang="en-US" dirty="0" smtClean="0"/>
+          </a:p>
+          <a:p>
+            <a:pPr algn="ctr">
+              <a:buNone/>
+            </a:pPr>
+            <a:r>
+              <a:rPr lang="en-US" b="1" dirty="0" smtClean="0"/>
+              <a:t>Enough slides, show me the </a:t>
+            </a:r>
+            <a:r>
+              <a:rPr lang="en-US" b="1" dirty="0" err="1" smtClean="0"/>
+              <a:t>codez</a:t>
+            </a:r>
+            <a:r>
+              <a:rPr lang="en-US" b="1" dirty="0" smtClean="0"/>
+              <a:t>!</a:t>
+            </a:r>
+          </a:p>
+          <a:p>
+            <a:pPr algn="ctr">
+              <a:buNone/>
+            </a:pPr>
+            <a:endParaRPr lang="en-US" b="1" dirty="0" smtClean="0"/>
+          </a:p>
+          <a:p>
+            <a:pPr algn="ctr">
+              <a:buNone/>
+            </a:pPr>
+            <a:r>
+              <a:rPr lang="en-US" sz="2600" dirty="0" smtClean="0">
+                <a:hlinkClick r:id="rId2"/>
+              </a:rPr>
+              <a:t>https://</a:t>
+            </a:r>
+            <a:r>
+              <a:rPr lang="en-US" sz="2600" dirty="0" smtClean="0">
+                <a:hlinkClick r:id="rId2"/>
+              </a:rPr>
+              <a:t>github.com/jbellmore/GSDC-2014-AngularJS</a:t>
+            </a:r>
+            <a:endParaRPr lang="en-US" sz="2600" dirty="0" smtClean="0"/>
+          </a:p>
+        </p:txBody>
+      </p:sp>
+      <p:sp>
+        <p:nvSpPr>
+          <p:cNvPr id="3" name="Title 2"/>
+          <p:cNvSpPr>
+            <a:spLocks noGrp="1"/>
+          </p:cNvSpPr>
+          <p:nvPr>
+            <p:ph type="title"/>
+          </p:nvPr>
+        </p:nvSpPr>
+        <p:spPr/>
+        <p:txBody>
+          <a:bodyPr/>
+          <a:lstStyle/>
+          <a:p>
+            <a:r>
+              <a:rPr lang="en-US" dirty="0" smtClean="0"/>
+              <a:t>Demo</a:t>
+            </a:r>
+            <a:endParaRPr lang="en-US" dirty="0"/>
+          </a:p>
+        </p:txBody>
+      </p:sp>
+      <p:sp>
+        <p:nvSpPr>
+          <p:cNvPr id="4" name="Date Placeholder 3"/>
+          <p:cNvSpPr>
+            <a:spLocks noGrp="1"/>
+          </p:cNvSpPr>
+          <p:nvPr>
+            <p:ph type="dt" sz="half" idx="2"/>
+          </p:nvPr>
+        </p:nvSpPr>
+        <p:spPr/>
+        <p:txBody>
+          <a:bodyPr/>
+          <a:lstStyle/>
+          <a:p>
+            <a:r>
+              <a:rPr lang="en-US" smtClean="0"/>
+              <a:t>May 7, 2014</a:t>
+            </a:r>
+            <a:endParaRPr lang="en-US"/>
+          </a:p>
+        </p:txBody>
+      </p:sp>
+      <p:sp>
+        <p:nvSpPr>
+          <p:cNvPr id="5" name="Footer Placeholder 4"/>
+          <p:cNvSpPr>
+            <a:spLocks noGrp="1"/>
+          </p:cNvSpPr>
+          <p:nvPr>
+            <p:ph type="ftr" sz="quarter" idx="3"/>
+          </p:nvPr>
+        </p:nvSpPr>
+        <p:spPr/>
+        <p:txBody>
+          <a:bodyPr/>
+          <a:lstStyle/>
+          <a:p>
+            <a:r>
+              <a:rPr lang="en-US" smtClean="0"/>
+              <a:t>2014 Guardian Software Developer Conference </a:t>
+            </a:r>
+            <a:endParaRPr lang="en-US" dirty="0"/>
+          </a:p>
+        </p:txBody>
+      </p:sp>
+      <p:sp>
+        <p:nvSpPr>
+          <p:cNvPr id="6" name="Slide Number Placeholder 5"/>
+          <p:cNvSpPr>
+            <a:spLocks noGrp="1"/>
+          </p:cNvSpPr>
+          <p:nvPr>
+            <p:ph type="sldNum" sz="quarter" idx="4"/>
+          </p:nvPr>
+        </p:nvSpPr>
+        <p:spPr/>
+        <p:txBody>
+          <a:bodyPr/>
+          <a:lstStyle/>
+          <a:p>
+            <a:fld id="{24A51D8B-51BA-45F9-A651-4243A6A9861C}" type="slidenum">
+              <a:rPr lang="en-US" smtClean="0"/>
+              <a:pPr/>
+              <a:t>11</a:t>
+            </a:fld>
+            <a:endParaRPr lang="en-US" dirty="0"/>
+          </a:p>
+        </p:txBody>
+      </p:sp>
+    </p:spTree>
+  </p:cSld>
+  <p:clrMapOvr>
+    <a:masterClrMapping/>
+  </p:clrMapOvr>
+  <p:timing>
+    <p:tnLst>
+      <p:par>
+        <p:cTn id="1" dur="indefinite" restart="never" nodeType="tmRoot"/>
+      </p:par>
+    </p:tnLst>
+  </p:timing>
+</p:sld>
+</file>
+
+<file path=ppt/slides/slide12.xml><?xml version="1.0" encoding="utf-8"?>
+<p:sld xmlns:a="http://schemas.openxmlformats.org/drawingml/2006/main" xmlns:r="http://schemas.openxmlformats.org/officeDocument/2006/relationships" xmlns:p="http://schemas.openxmlformats.org/presentationml/2006/main">
+  <p:cSld>
+    <p:spTree>
+      <p:nvGrpSpPr>
+        <p:cNvPr id="1" name=""/>
+        <p:cNvGrpSpPr/>
+        <p:nvPr/>
+      </p:nvGrpSpPr>
+      <p:grpSpPr>
+        <a:xfrm>
+          <a:off x="0" y="0"/>
+          <a:ext cx="0" cy="0"/>
+          <a:chOff x="0" y="0"/>
+          <a:chExt cx="0" cy="0"/>
+        </a:xfrm>
+      </p:grpSpPr>
+      <p:sp>
+        <p:nvSpPr>
+          <p:cNvPr id="2" name="Content Placeholder 1"/>
+          <p:cNvSpPr>
+            <a:spLocks noGrp="1"/>
+          </p:cNvSpPr>
+          <p:nvPr>
+            <p:ph idx="1"/>
+          </p:nvPr>
+        </p:nvSpPr>
+        <p:spPr/>
+        <p:txBody>
+          <a:bodyPr/>
+          <a:lstStyle/>
+          <a:p>
+            <a:r>
+              <a:rPr lang="de-DE" dirty="0" smtClean="0">
+                <a:hlinkClick r:id="rId2"/>
+              </a:rPr>
+              <a:t>Dan Wahlin - AngularJS Fundamentals in 60-ish Minutes </a:t>
+            </a:r>
+            <a:r>
+              <a:rPr lang="de-DE" dirty="0" smtClean="0">
+                <a:hlinkClick r:id="rId2"/>
+              </a:rPr>
+              <a:t>Video</a:t>
+            </a:r>
+            <a:endParaRPr lang="de-DE" dirty="0" smtClean="0"/>
+          </a:p>
+          <a:p>
+            <a:endParaRPr lang="de-DE" dirty="0" smtClean="0">
+              <a:hlinkClick r:id="rId3"/>
+            </a:endParaRPr>
+          </a:p>
+          <a:p>
+            <a:r>
+              <a:rPr lang="de-DE" dirty="0" smtClean="0">
+                <a:hlinkClick r:id="rId3"/>
+              </a:rPr>
+              <a:t>https</a:t>
+            </a:r>
+            <a:r>
+              <a:rPr lang="de-DE" dirty="0" smtClean="0">
+                <a:hlinkClick r:id="rId3"/>
+              </a:rPr>
+              <a:t>://</a:t>
+            </a:r>
+            <a:r>
+              <a:rPr lang="de-DE" dirty="0" smtClean="0">
+                <a:hlinkClick r:id="rId3"/>
+              </a:rPr>
+              <a:t>egghead.io/technologies/angularjs</a:t>
+            </a:r>
+            <a:endParaRPr lang="de-DE" dirty="0" smtClean="0"/>
+          </a:p>
+          <a:p>
+            <a:endParaRPr lang="en-US" dirty="0" smtClean="0">
+              <a:hlinkClick r:id="rId4"/>
+            </a:endParaRPr>
+          </a:p>
+          <a:p>
+            <a:r>
+              <a:rPr lang="en-US" dirty="0" err="1" smtClean="0">
+                <a:hlinkClick r:id="rId4"/>
+              </a:rPr>
+              <a:t>AngularJS</a:t>
+            </a:r>
+            <a:r>
+              <a:rPr lang="en-US" dirty="0" smtClean="0">
+                <a:hlinkClick r:id="rId4"/>
+              </a:rPr>
+              <a:t> Yammer Group</a:t>
+            </a:r>
+            <a:endParaRPr lang="en-US" dirty="0" smtClean="0"/>
+          </a:p>
+          <a:p>
+            <a:endParaRPr lang="en-US" dirty="0"/>
+          </a:p>
+        </p:txBody>
+      </p:sp>
+      <p:sp>
+        <p:nvSpPr>
+          <p:cNvPr id="3" name="Title 2"/>
+          <p:cNvSpPr>
+            <a:spLocks noGrp="1"/>
+          </p:cNvSpPr>
+          <p:nvPr>
+            <p:ph type="title"/>
+          </p:nvPr>
+        </p:nvSpPr>
+        <p:spPr/>
+        <p:txBody>
+          <a:bodyPr/>
+          <a:lstStyle/>
+          <a:p>
+            <a:r>
+              <a:rPr lang="en-US" dirty="0" smtClean="0"/>
+              <a:t>Additional Resources</a:t>
+            </a:r>
+            <a:endParaRPr lang="en-US" dirty="0"/>
+          </a:p>
+        </p:txBody>
+      </p:sp>
+      <p:sp>
+        <p:nvSpPr>
+          <p:cNvPr id="4" name="Date Placeholder 3"/>
+          <p:cNvSpPr>
+            <a:spLocks noGrp="1"/>
+          </p:cNvSpPr>
+          <p:nvPr>
+            <p:ph type="dt" sz="half" idx="2"/>
+          </p:nvPr>
+        </p:nvSpPr>
+        <p:spPr/>
+        <p:txBody>
+          <a:bodyPr/>
+          <a:lstStyle/>
+          <a:p>
+            <a:r>
+              <a:rPr lang="en-US" smtClean="0"/>
+              <a:t>May 7, 2014</a:t>
+            </a:r>
+            <a:endParaRPr lang="en-US"/>
+          </a:p>
+        </p:txBody>
+      </p:sp>
+      <p:sp>
+        <p:nvSpPr>
+          <p:cNvPr id="5" name="Footer Placeholder 4"/>
+          <p:cNvSpPr>
+            <a:spLocks noGrp="1"/>
+          </p:cNvSpPr>
+          <p:nvPr>
+            <p:ph type="ftr" sz="quarter" idx="3"/>
+          </p:nvPr>
+        </p:nvSpPr>
+        <p:spPr/>
+        <p:txBody>
+          <a:bodyPr/>
+          <a:lstStyle/>
+          <a:p>
+            <a:r>
+              <a:rPr lang="en-US" smtClean="0"/>
+              <a:t>2014 Guardian Software Developer Conference </a:t>
+            </a:r>
+            <a:endParaRPr lang="en-US" dirty="0"/>
+          </a:p>
+        </p:txBody>
+      </p:sp>
+      <p:sp>
+        <p:nvSpPr>
+          <p:cNvPr id="6" name="Slide Number Placeholder 5"/>
+          <p:cNvSpPr>
+            <a:spLocks noGrp="1"/>
+          </p:cNvSpPr>
+          <p:nvPr>
+            <p:ph type="sldNum" sz="quarter" idx="4"/>
+          </p:nvPr>
+        </p:nvSpPr>
+        <p:spPr/>
+        <p:txBody>
+          <a:bodyPr/>
+          <a:lstStyle/>
+          <a:p>
+            <a:fld id="{24A51D8B-51BA-45F9-A651-4243A6A9861C}" type="slidenum">
+              <a:rPr lang="en-US" smtClean="0"/>
+              <a:pPr/>
+              <a:t>12</a:t>
+            </a:fld>
+            <a:endParaRPr lang="en-US" dirty="0"/>
+          </a:p>
+        </p:txBody>
+      </p:sp>
+    </p:spTree>
   </p:cSld>
   <p:clrMapOvr>
     <a:masterClrMapping/>
@@ -2639,7 +3379,33 @@
           <a:p>
             <a:r>
               <a:rPr lang="en-US" dirty="0" smtClean="0"/>
-              <a:t>Define what a single page app is</a:t>
+              <a:t> An application that only performs one full page load and dynamically loads data &amp; markup as needed asynchronously.</a:t>
+            </a:r>
+          </a:p>
+          <a:p>
+            <a:endParaRPr lang="en-US" sz="1200" dirty="0" smtClean="0"/>
+          </a:p>
+          <a:p>
+            <a:r>
+              <a:rPr lang="en-US" dirty="0" smtClean="0"/>
+              <a:t> One giant page, are you crazy?!</a:t>
+            </a:r>
+          </a:p>
+          <a:p>
+            <a:pPr lvl="1"/>
+            <a:r>
+              <a:rPr lang="en-US" dirty="0" smtClean="0"/>
+              <a:t>No, I promise I am not…</a:t>
+            </a:r>
+          </a:p>
+          <a:p>
+            <a:pPr lvl="1"/>
+            <a:endParaRPr lang="en-US" sz="1400" dirty="0" smtClean="0"/>
+          </a:p>
+          <a:p>
+            <a:r>
+              <a:rPr lang="en-US" dirty="0" smtClean="0"/>
+              <a:t> Not really new, just evolution of things we already do!</a:t>
             </a:r>
           </a:p>
           <a:p>
@@ -2663,7 +3429,7 @@
           <a:lstStyle/>
           <a:p>
             <a:r>
-              <a:rPr lang="en-US" dirty="0" smtClean="0"/>
+              <a:rPr lang="en-US" smtClean="0"/>
               <a:t>Single Page Apps?</a:t>
             </a:r>
             <a:endParaRPr lang="en-US" dirty="0"/>
@@ -2686,7 +3452,7 @@
           <a:lstStyle/>
           <a:p>
             <a:r>
-              <a:rPr lang="en-US" dirty="0" smtClean="0"/>
+              <a:rPr lang="en-US" smtClean="0"/>
               <a:t>May 7, 2014</a:t>
             </a:r>
             <a:endParaRPr lang="en-US" dirty="0"/>
@@ -2709,7 +3475,7 @@
           <a:lstStyle/>
           <a:p>
             <a:r>
-              <a:rPr lang="en-US" dirty="0" smtClean="0"/>
+              <a:rPr lang="en-US" smtClean="0"/>
               <a:t>2014 Guardian Software Developer Conference </a:t>
             </a:r>
             <a:endParaRPr lang="en-US" dirty="0"/>
@@ -2743,7 +3509,7 @@
     </p:spTree>
     <p:extLst>
       <p:ext uri="{BB962C8B-B14F-4D97-AF65-F5344CB8AC3E}">
-        <p14:creationId xmlns:p14="http://schemas.microsoft.com/office/powerpoint/2010/main" xmlns="" val="1282900493"/>
+        <p14:creationId xmlns="" xmlns:p14="http://schemas.microsoft.com/office/powerpoint/2010/main" val="1282900493"/>
       </p:ext>
     </p:extLst>
   </p:cSld>
@@ -2779,112 +3545,6 @@
       </p:grpSpPr>
       <p:sp>
         <p:nvSpPr>
-          <p:cNvPr id="2" name="Content Placeholder 1"/>
-          <p:cNvSpPr>
-            <a:spLocks noGrp="1"/>
-          </p:cNvSpPr>
-          <p:nvPr>
-            <p:ph idx="1"/>
-          </p:nvPr>
-        </p:nvSpPr>
-        <p:spPr/>
-        <p:txBody>
-          <a:bodyPr/>
-          <a:lstStyle/>
-          <a:p>
-            <a:pPr>
-              <a:buFont typeface="Arial" pitchFamily="34" charset="0"/>
-              <a:buChar char="•"/>
-            </a:pPr>
-            <a:r>
-              <a:rPr lang="en-US" dirty="0" smtClean="0"/>
-              <a:t>Define </a:t>
-            </a:r>
-            <a:r>
-              <a:rPr lang="en-US" dirty="0" smtClean="0"/>
-              <a:t>the need for a SPA framework</a:t>
-            </a:r>
-          </a:p>
-          <a:p>
-            <a:pPr>
-              <a:buFont typeface="Arial" pitchFamily="34" charset="0"/>
-              <a:buChar char="•"/>
-            </a:pPr>
-            <a:r>
-              <a:rPr lang="en-US" dirty="0" smtClean="0"/>
-              <a:t>Framework </a:t>
-            </a:r>
-            <a:r>
-              <a:rPr lang="en-US" dirty="0" err="1" smtClean="0"/>
-              <a:t>vs</a:t>
-            </a:r>
-            <a:r>
-              <a:rPr lang="en-US" dirty="0" smtClean="0"/>
-              <a:t> library</a:t>
-            </a:r>
-          </a:p>
-          <a:p>
-            <a:pPr>
-              <a:buFont typeface="Arial" pitchFamily="34" charset="0"/>
-              <a:buChar char="•"/>
-            </a:pPr>
-            <a:r>
-              <a:rPr lang="en-US" dirty="0" smtClean="0"/>
-              <a:t>Talk </a:t>
-            </a:r>
-            <a:r>
-              <a:rPr lang="en-US" dirty="0" smtClean="0"/>
-              <a:t>about the mess that is combinations of 14 </a:t>
-            </a:r>
-            <a:r>
-              <a:rPr lang="en-US" dirty="0" smtClean="0"/>
-              <a:t>different </a:t>
-            </a:r>
-            <a:r>
-              <a:rPr lang="en-US" dirty="0" smtClean="0"/>
-              <a:t>tools</a:t>
-            </a:r>
-          </a:p>
-          <a:p>
-            <a:pPr>
-              <a:buFont typeface="Arial" pitchFamily="34" charset="0"/>
-              <a:buChar char="•"/>
-            </a:pPr>
-            <a:r>
-              <a:rPr lang="en-US" dirty="0" smtClean="0"/>
-              <a:t>Define </a:t>
-            </a:r>
-            <a:r>
-              <a:rPr lang="en-US" dirty="0" smtClean="0"/>
-              <a:t>what capabilities a SPA framework provides	</a:t>
-            </a:r>
-          </a:p>
-          <a:p>
-            <a:pPr lvl="1"/>
-            <a:r>
-              <a:rPr lang="en-US" dirty="0" smtClean="0"/>
-              <a:t>Application structure/consistency</a:t>
-            </a:r>
-          </a:p>
-          <a:p>
-            <a:pPr lvl="1"/>
-            <a:r>
-              <a:rPr lang="en-US" dirty="0" smtClean="0"/>
-              <a:t>State/routing/deep linking</a:t>
-            </a:r>
-          </a:p>
-          <a:p>
-            <a:pPr lvl="1"/>
-            <a:r>
-              <a:rPr lang="en-US" dirty="0" smtClean="0"/>
-              <a:t>Inter application communication</a:t>
-            </a:r>
-            <a:endParaRPr lang="en-US" dirty="0"/>
-          </a:p>
-        </p:txBody>
-      </p:sp>
-      <p:sp>
-        <p:nvSpPr>
           <p:cNvPr id="3" name="Title 2"/>
           <p:cNvSpPr>
             <a:spLocks noGrp="1"/>
@@ -2893,24 +3553,23 @@
             <p:ph type="title"/>
           </p:nvPr>
         </p:nvSpPr>
-        <p:spPr/>
-        <p:txBody>
-          <a:bodyPr/>
-          <a:lstStyle/>
-          <a:p>
-            <a:r>
-              <a:rPr lang="en-US" dirty="0" smtClean="0"/>
-              <a:t>Why </a:t>
-            </a:r>
-            <a:r>
-              <a:rPr lang="en-US" dirty="0" err="1" smtClean="0"/>
-              <a:t>AngularJS</a:t>
-            </a:r>
-            <a:r>
-              <a:rPr lang="en-US" dirty="0" smtClean="0"/>
-              <a:t>?</a:t>
-            </a:r>
-            <a:endParaRPr lang="en-US" dirty="0"/>
+        <p:spPr>
+          <a:xfrm>
+            <a:off x="457200" y="76200"/>
+            <a:ext cx="8229600" cy="1143000"/>
+          </a:xfrm>
+        </p:spPr>
+        <p:txBody>
+          <a:bodyPr>
+            <a:normAutofit/>
+          </a:bodyPr>
+          <a:lstStyle/>
+          <a:p>
+            <a:r>
+              <a:rPr lang="en-US" sz="3200" dirty="0" smtClean="0"/>
+              <a:t>Traditional Page Lifecycle</a:t>
+            </a:r>
+            <a:endParaRPr lang="en-US" sz="3200" dirty="0"/>
           </a:p>
         </p:txBody>
       </p:sp>
@@ -2984,11 +3643,52 @@
           </a:p>
         </p:txBody>
       </p:sp>
+      <p:pic>
+        <p:nvPicPr>
+          <p:cNvPr id="1031" name="Picture 7"/>
+          <p:cNvPicPr>
+            <a:picLocks noChangeAspect="1" noChangeArrowheads="1"/>
+          </p:cNvPicPr>
+          <p:nvPr/>
+        </p:nvPicPr>
+        <p:blipFill>
+          <a:blip r:embed="rId2" cstate="print"/>
+          <a:srcRect/>
+          <a:stretch>
+            <a:fillRect/>
+          </a:stretch>
+        </p:blipFill>
+        <p:spPr bwMode="auto">
+          <a:xfrm>
+            <a:off x="1339175" y="990599"/>
+            <a:ext cx="6509425" cy="4934565"/>
+          </a:xfrm>
+          <a:prstGeom prst="rect">
+            <a:avLst/>
+          </a:prstGeom>
+          <a:noFill/>
+          <a:ln w="6350" cap="rnd">
+            <a:solidFill>
+              <a:schemeClr val="tx1"/>
+            </a:solidFill>
+            <a:round/>
+            <a:headEnd/>
+            <a:tailEnd/>
+          </a:ln>
+        </p:spPr>
+      </p:pic>
     </p:spTree>
   </p:cSld>
   <p:clrMapOvr>
     <a:masterClrMapping/>
   </p:clrMapOvr>
+  <p:timing>
+    <p:tnLst>
+      <p:par>
+        <p:cTn id="1" dur="indefinite" restart="never" nodeType="tmRoot"/>
+      </p:par>
+    </p:tnLst>
+  </p:timing>
 </p:sld>
 </file>
 
@@ -3011,55 +3711,6 @@
       </p:grpSpPr>
       <p:sp>
         <p:nvSpPr>
-          <p:cNvPr id="2" name="Content Placeholder 1"/>
-          <p:cNvSpPr>
-            <a:spLocks noGrp="1"/>
-          </p:cNvSpPr>
-          <p:nvPr>
-            <p:ph idx="1"/>
-          </p:nvPr>
-        </p:nvSpPr>
-        <p:spPr/>
-        <p:txBody>
-          <a:bodyPr/>
-          <a:lstStyle/>
-          <a:p>
-            <a:pPr>
-              <a:buFont typeface="Arial" pitchFamily="34" charset="0"/>
-              <a:buChar char="•"/>
-            </a:pPr>
-            <a:r>
-              <a:rPr lang="en-US" dirty="0" smtClean="0"/>
-              <a:t>Discuss documentation that can be found there</a:t>
-            </a:r>
-          </a:p>
-          <a:p>
-            <a:pPr>
-              <a:buFont typeface="Arial" pitchFamily="34" charset="0"/>
-              <a:buChar char="•"/>
-            </a:pPr>
-            <a:r>
-              <a:rPr lang="en-US" dirty="0" smtClean="0"/>
-              <a:t>Talk about difficulties caused by documentation using SPA “buzzwords”</a:t>
-            </a:r>
-          </a:p>
-          <a:p>
-            <a:pPr>
-              <a:buFont typeface="Arial" pitchFamily="34" charset="0"/>
-              <a:buChar char="•"/>
-            </a:pPr>
-            <a:r>
-              <a:rPr lang="en-US" dirty="0" smtClean="0"/>
-              <a:t>Throw away preconceptions of how web apps work, once you understand the concepts Angular becomes WAY easier</a:t>
-            </a:r>
-          </a:p>
-          <a:p>
-            <a:endParaRPr lang="en-US" dirty="0"/>
-          </a:p>
-        </p:txBody>
-      </p:sp>
-      <p:sp>
-        <p:nvSpPr>
           <p:cNvPr id="3" name="Title 2"/>
           <p:cNvSpPr>
             <a:spLocks noGrp="1"/>
@@ -3068,16 +3719,23 @@
             <p:ph type="title"/>
           </p:nvPr>
         </p:nvSpPr>
-        <p:spPr/>
-        <p:txBody>
-          <a:bodyPr/>
-          <a:lstStyle/>
-          <a:p>
-            <a:r>
-              <a:rPr lang="en-US" dirty="0" smtClean="0"/>
-              <a:t>Getting Started</a:t>
-            </a:r>
-            <a:endParaRPr lang="en-US" dirty="0"/>
+        <p:spPr>
+          <a:xfrm>
+            <a:off x="457200" y="76200"/>
+            <a:ext cx="8229600" cy="1143000"/>
+          </a:xfrm>
+        </p:spPr>
+        <p:txBody>
+          <a:bodyPr>
+            <a:normAutofit/>
+          </a:bodyPr>
+          <a:lstStyle/>
+          <a:p>
+            <a:r>
+              <a:rPr lang="en-US" sz="3200" dirty="0" smtClean="0"/>
+              <a:t>SPA Page Lifecycle</a:t>
+            </a:r>
+            <a:endParaRPr lang="en-US" sz="3200" dirty="0"/>
           </a:p>
         </p:txBody>
       </p:sp>
@@ -3151,11 +3809,52 @@
           </a:p>
         </p:txBody>
       </p:sp>
+      <p:pic>
+        <p:nvPicPr>
+          <p:cNvPr id="2050" name="Picture 2"/>
+          <p:cNvPicPr>
+            <a:picLocks noChangeAspect="1" noChangeArrowheads="1"/>
+          </p:cNvPicPr>
+          <p:nvPr/>
+        </p:nvPicPr>
+        <p:blipFill>
+          <a:blip r:embed="rId2" cstate="print"/>
+          <a:srcRect/>
+          <a:stretch>
+            <a:fillRect/>
+          </a:stretch>
+        </p:blipFill>
+        <p:spPr bwMode="auto">
+          <a:xfrm>
+            <a:off x="1345660" y="990600"/>
+            <a:ext cx="6502940" cy="4929648"/>
+          </a:xfrm>
+          <a:prstGeom prst="rect">
+            <a:avLst/>
+          </a:prstGeom>
+          <a:noFill/>
+          <a:ln w="6350" cap="rnd">
+            <a:solidFill>
+              <a:schemeClr val="tx1"/>
+            </a:solidFill>
+            <a:round/>
+            <a:headEnd/>
+            <a:tailEnd/>
+          </a:ln>
+        </p:spPr>
+      </p:pic>
     </p:spTree>
   </p:cSld>
   <p:clrMapOvr>
     <a:masterClrMapping/>
   </p:clrMapOvr>
+  <p:timing>
+    <p:tnLst>
+      <p:par>
+        <p:cTn id="1" dur="indefinite" restart="never" nodeType="tmRoot"/>
+      </p:par>
+    </p:tnLst>
+  </p:timing>
 </p:sld>
 </file>
 
@@ -3192,100 +3891,75 @@
           <a:lstStyle/>
           <a:p>
             <a:pPr>
-              <a:buFont typeface="Arial" pitchFamily="34" charset="0"/>
-              <a:buChar char="•"/>
+              <a:spcAft>
+                <a:spcPts val="600"/>
+              </a:spcAft>
             </a:pPr>
             <a:r>
+              <a:rPr lang="en-US" sz="2600" dirty="0" smtClean="0"/>
+              <a:t>Fast and responsive user experiences</a:t>
+            </a:r>
+          </a:p>
+          <a:p>
+            <a:pPr>
+              <a:spcAft>
+                <a:spcPts val="600"/>
+              </a:spcAft>
+            </a:pPr>
+            <a:r>
+              <a:rPr lang="en-US" sz="2600" dirty="0" smtClean="0"/>
+              <a:t>Lighter payloads – great for mobile</a:t>
+            </a:r>
+          </a:p>
+          <a:p>
+            <a:pPr>
+              <a:spcAft>
+                <a:spcPts val="600"/>
+              </a:spcAft>
+            </a:pPr>
+            <a:r>
+              <a:rPr lang="en-US" sz="2600" dirty="0" smtClean="0"/>
+              <a:t>Clear separation between client and server –responsibilities</a:t>
+            </a:r>
+          </a:p>
+          <a:p>
+            <a:r>
+              <a:rPr lang="en-US" sz="2600" dirty="0" smtClean="0"/>
+              <a:t>Application/session state managed in client</a:t>
+            </a:r>
+          </a:p>
+          <a:p>
+            <a:pPr lvl="1">
+              <a:spcAft>
+                <a:spcPts val="600"/>
+              </a:spcAft>
+            </a:pPr>
+            <a:r>
               <a:rPr lang="en-US" dirty="0" smtClean="0"/>
-              <a:t>Application structure/Initialization</a:t>
+              <a:t>Where it belongs!</a:t>
             </a:r>
           </a:p>
           <a:p>
             <a:pPr>
-              <a:buFont typeface="Arial" pitchFamily="34" charset="0"/>
-              <a:buChar char="•"/>
+              <a:spcAft>
+                <a:spcPts val="600"/>
+              </a:spcAft>
             </a:pPr>
             <a:r>
-              <a:rPr lang="en-US" dirty="0" smtClean="0"/>
-              <a:t>Modules</a:t>
+              <a:rPr lang="en-US" sz="2600" dirty="0" smtClean="0"/>
+              <a:t>Offload processing to the client, less stress on servers</a:t>
             </a:r>
           </a:p>
           <a:p>
             <a:pPr>
-              <a:buFont typeface="Arial" pitchFamily="34" charset="0"/>
-              <a:buChar char="•"/>
+              <a:spcAft>
+                <a:spcPts val="600"/>
+              </a:spcAft>
             </a:pPr>
             <a:r>
-              <a:rPr lang="en-US" dirty="0" smtClean="0"/>
-              <a:t>Dependency Injection</a:t>
-            </a:r>
-          </a:p>
-          <a:p>
-            <a:pPr>
-              <a:buFont typeface="Arial" pitchFamily="34" charset="0"/>
-              <a:buChar char="•"/>
-            </a:pPr>
-            <a:r>
-              <a:rPr lang="en-US" dirty="0" smtClean="0"/>
-              <a:t>Routing/State Management</a:t>
-            </a:r>
-          </a:p>
-          <a:p>
-            <a:pPr>
-              <a:buFont typeface="Arial" pitchFamily="34" charset="0"/>
-              <a:buChar char="•"/>
-            </a:pPr>
-            <a:r>
-              <a:rPr lang="en-US" dirty="0" smtClean="0"/>
-              <a:t>Controllers</a:t>
-            </a:r>
-          </a:p>
-          <a:p>
-            <a:pPr>
-              <a:buFont typeface="Arial" pitchFamily="34" charset="0"/>
-              <a:buChar char="•"/>
-            </a:pPr>
-            <a:r>
-              <a:rPr lang="en-US" dirty="0" smtClean="0"/>
-              <a:t>Views</a:t>
-            </a:r>
-          </a:p>
-          <a:p>
-            <a:pPr>
-              <a:buFont typeface="Arial" pitchFamily="34" charset="0"/>
-              <a:buChar char="•"/>
-            </a:pPr>
-            <a:r>
-              <a:rPr lang="en-US" dirty="0" smtClean="0"/>
-              <a:t>Scope</a:t>
-            </a:r>
-          </a:p>
-          <a:p>
-            <a:pPr>
-              <a:buFont typeface="Arial" pitchFamily="34" charset="0"/>
-              <a:buChar char="•"/>
-            </a:pPr>
-            <a:r>
-              <a:rPr lang="en-US" dirty="0" smtClean="0"/>
-              <a:t>Data-Binding</a:t>
-            </a:r>
-          </a:p>
-          <a:p>
-            <a:pPr>
-              <a:buFont typeface="Arial" pitchFamily="34" charset="0"/>
-              <a:buChar char="•"/>
-            </a:pPr>
-            <a:r>
-              <a:rPr lang="en-US" dirty="0" smtClean="0"/>
-              <a:t>Services</a:t>
-            </a:r>
-          </a:p>
-          <a:p>
-            <a:pPr>
-              <a:buFont typeface="Arial" pitchFamily="34" charset="0"/>
-              <a:buChar char="•"/>
-            </a:pPr>
-            <a:endParaRPr lang="en-US" dirty="0"/>
+              <a:rPr lang="en-US" sz="2600" dirty="0" smtClean="0"/>
+              <a:t>“It’s the new hotness!”</a:t>
+            </a:r>
           </a:p>
         </p:txBody>
       </p:sp>
@@ -3305,8 +3979,8 @@
           <a:lstStyle/>
           <a:p>
             <a:r>
-              <a:rPr lang="en-US" dirty="0" smtClean="0"/>
-              <a:t>Key Concepts</a:t>
+              <a:rPr lang="en-US" smtClean="0"/>
+              <a:t>Advantages</a:t>
             </a:r>
             <a:endParaRPr lang="en-US" dirty="0"/>
           </a:p>
@@ -3387,6 +4061,13 @@
   <p:clrMapOvr>
     <a:masterClrMapping/>
   </p:clrMapOvr>
+  <p:timing>
+    <p:tnLst>
+      <p:par>
+        <p:cTn id="1" dur="indefinite" restart="never" nodeType="tmRoot"/>
+      </p:par>
+    </p:tnLst>
+  </p:timing>
 </p:sld>
 </file>
 
@@ -3422,16 +4103,103 @@
           <a:bodyPr/>
           <a:lstStyle/>
           <a:p>
-            <a:r>
-              <a:rPr lang="de-DE" dirty="0" smtClean="0">
-                <a:hlinkClick r:id="rId2"/>
-              </a:rPr>
-              <a:t>Dan Wahlin - AngularJS Fundamentals in 60-ish Minutes Video</a:t>
-            </a:r>
-            <a:endParaRPr lang="en-US" smtClean="0"/>
-          </a:p>
-          <a:p>
-            <a:endParaRPr lang="en-US"/>
+            <a:pPr>
+              <a:spcAft>
+                <a:spcPts val="600"/>
+              </a:spcAft>
+            </a:pPr>
+            <a:r>
+              <a:rPr lang="en-US" dirty="0" smtClean="0"/>
+              <a:t>Heavier initial page load</a:t>
+            </a:r>
+          </a:p>
+          <a:p>
+            <a:pPr>
+              <a:spcAft>
+                <a:spcPts val="600"/>
+              </a:spcAft>
+            </a:pPr>
+            <a:r>
+              <a:rPr lang="en-US" dirty="0" smtClean="0"/>
+              <a:t>Requires more client side resources</a:t>
+            </a:r>
+          </a:p>
+          <a:p>
+            <a:pPr>
+              <a:spcAft>
+                <a:spcPts val="600"/>
+              </a:spcAft>
+            </a:pPr>
+            <a:r>
+              <a:rPr lang="en-US" dirty="0" smtClean="0"/>
+              <a:t>Potential problems with legacy browsers</a:t>
+            </a:r>
+          </a:p>
+          <a:p>
+            <a:r>
+              <a:rPr lang="en-US" dirty="0" smtClean="0"/>
+              <a:t>Requires deeper understanding of </a:t>
+            </a:r>
+            <a:r>
+              <a:rPr lang="en-US" dirty="0" err="1" smtClean="0"/>
+              <a:t>Javascript</a:t>
+            </a:r>
+            <a:endParaRPr lang="en-US" dirty="0" smtClean="0"/>
+          </a:p>
+          <a:p>
+            <a:pPr lvl="1"/>
+            <a:r>
+              <a:rPr lang="en-US" dirty="0" err="1" smtClean="0"/>
+              <a:t>jQuery</a:t>
+            </a:r>
+            <a:r>
+              <a:rPr lang="en-US" dirty="0" smtClean="0"/>
+              <a:t> != </a:t>
+            </a:r>
+            <a:r>
+              <a:rPr lang="en-US" dirty="0" err="1" smtClean="0"/>
+              <a:t>Javascript</a:t>
+            </a:r>
+            <a:r>
+              <a:rPr lang="en-US" dirty="0" smtClean="0"/>
+              <a:t>!</a:t>
+            </a:r>
+          </a:p>
+          <a:p>
+            <a:pPr lvl="1">
+              <a:spcAft>
+                <a:spcPts val="600"/>
+              </a:spcAft>
+            </a:pPr>
+            <a:r>
+              <a:rPr lang="en-US" dirty="0" smtClean="0"/>
+              <a:t>Need to open the “sharp tools drawer”</a:t>
+            </a:r>
+          </a:p>
+          <a:p>
+            <a:pPr>
+              <a:spcAft>
+                <a:spcPts val="600"/>
+              </a:spcAft>
+            </a:pPr>
+            <a:r>
+              <a:rPr lang="en-US" dirty="0" err="1" smtClean="0"/>
+              <a:t>Bookmarkability</a:t>
+            </a:r>
+            <a:r>
+              <a:rPr lang="en-US" dirty="0" smtClean="0"/>
+              <a:t> </a:t>
+            </a:r>
+            <a:r>
+              <a:rPr lang="en-US" dirty="0" smtClean="0"/>
+              <a:t>/ Deep Linking</a:t>
+            </a:r>
+          </a:p>
+          <a:p>
+            <a:endParaRPr lang="en-US" dirty="0" smtClean="0"/>
+          </a:p>
+          <a:p>
+            <a:endParaRPr lang="en-US" dirty="0"/>
           </a:p>
         </p:txBody>
       </p:sp>
@@ -3452,7 +4220,7 @@
           <a:p>
             <a:r>
               <a:rPr lang="en-US" dirty="0" smtClean="0"/>
-              <a:t>Additional Resources</a:t>
+              <a:t>Disadvantages &amp; Challenges</a:t>
             </a:r>
             <a:endParaRPr lang="en-US" dirty="0"/>
           </a:p>
@@ -3533,6 +4301,660 @@
   <p:clrMapOvr>
     <a:masterClrMapping/>
   </p:clrMapOvr>
+  <p:timing>
+    <p:tnLst>
+      <p:par>
+        <p:cTn id="1" dur="indefinite" restart="never" nodeType="tmRoot"/>
+      </p:par>
+    </p:tnLst>
+  </p:timing>
+</p:sld>
+</file>
+
+<file path=ppt/slides/slide7.xml><?xml version="1.0" encoding="utf-8"?>
+<p:sld xmlns:a="http://schemas.openxmlformats.org/drawingml/2006/main" xmlns:r="http://schemas.openxmlformats.org/officeDocument/2006/relationships" xmlns:p="http://schemas.openxmlformats.org/presentationml/2006/main">
+  <p:cSld>
+    <p:spTree>
+      <p:nvGrpSpPr>
+        <p:cNvPr id="1" name=""/>
+        <p:cNvGrpSpPr/>
+        <p:nvPr/>
+      </p:nvGrpSpPr>
+      <p:grpSpPr>
+        <a:xfrm>
+          <a:off x="0" y="0"/>
+          <a:ext cx="0" cy="0"/>
+          <a:chOff x="0" y="0"/>
+          <a:chExt cx="0" cy="0"/>
+        </a:xfrm>
+      </p:grpSpPr>
+      <p:sp>
+        <p:nvSpPr>
+          <p:cNvPr id="2" name="Content Placeholder 1"/>
+          <p:cNvSpPr>
+            <a:spLocks noGrp="1"/>
+          </p:cNvSpPr>
+          <p:nvPr>
+            <p:ph idx="1"/>
+          </p:nvPr>
+        </p:nvSpPr>
+        <p:spPr/>
+        <p:txBody>
+          <a:bodyPr>
+            <a:normAutofit/>
+          </a:bodyPr>
+          <a:lstStyle/>
+          <a:p>
+            <a:r>
+              <a:rPr lang="en-US" dirty="0" smtClean="0"/>
+              <a:t>Application structure/consistency</a:t>
+            </a:r>
+          </a:p>
+          <a:p>
+            <a:pPr lvl="1">
+              <a:spcAft>
+                <a:spcPts val="600"/>
+              </a:spcAft>
+            </a:pPr>
+            <a:r>
+              <a:rPr lang="en-US" dirty="0" smtClean="0"/>
+              <a:t>Dependency management</a:t>
+            </a:r>
+          </a:p>
+          <a:p>
+            <a:r>
+              <a:rPr lang="en-US" dirty="0" smtClean="0"/>
+              <a:t>State management</a:t>
+            </a:r>
+          </a:p>
+          <a:p>
+            <a:pPr lvl="1"/>
+            <a:r>
+              <a:rPr lang="en-US" dirty="0" smtClean="0"/>
+              <a:t>Routing</a:t>
+            </a:r>
+          </a:p>
+          <a:p>
+            <a:pPr lvl="1">
+              <a:spcAft>
+                <a:spcPts val="600"/>
+              </a:spcAft>
+            </a:pPr>
+            <a:r>
+              <a:rPr lang="en-US" dirty="0" smtClean="0"/>
+              <a:t>Deep linking</a:t>
+            </a:r>
+          </a:p>
+          <a:p>
+            <a:pPr>
+              <a:spcAft>
+                <a:spcPts val="600"/>
+              </a:spcAft>
+            </a:pPr>
+            <a:r>
+              <a:rPr lang="en-US" dirty="0" smtClean="0"/>
+              <a:t>Data binding</a:t>
+            </a:r>
+          </a:p>
+          <a:p>
+            <a:r>
+              <a:rPr lang="en-US" dirty="0" smtClean="0"/>
+              <a:t>Internal application communication</a:t>
+            </a:r>
+          </a:p>
+          <a:p>
+            <a:pPr lvl="1">
+              <a:spcAft>
+                <a:spcPts val="600"/>
+              </a:spcAft>
+            </a:pPr>
+            <a:r>
+              <a:rPr lang="en-US" dirty="0" smtClean="0"/>
+              <a:t>DRY code</a:t>
+            </a:r>
+          </a:p>
+          <a:p>
+            <a:pPr>
+              <a:spcAft>
+                <a:spcPts val="600"/>
+              </a:spcAft>
+            </a:pPr>
+            <a:r>
+              <a:rPr lang="en-US" dirty="0" err="1" smtClean="0"/>
+              <a:t>Extensability</a:t>
+            </a:r>
+            <a:endParaRPr lang="en-US" dirty="0" smtClean="0"/>
+          </a:p>
+          <a:p>
+            <a:endParaRPr lang="en-US" dirty="0"/>
+          </a:p>
+        </p:txBody>
+      </p:sp>
+      <p:sp>
+        <p:nvSpPr>
+          <p:cNvPr id="3" name="Title 2"/>
+          <p:cNvSpPr>
+            <a:spLocks noGrp="1"/>
+          </p:cNvSpPr>
+          <p:nvPr>
+            <p:ph type="title"/>
+          </p:nvPr>
+        </p:nvSpPr>
+        <p:spPr/>
+        <p:txBody>
+          <a:bodyPr>
+            <a:normAutofit/>
+          </a:bodyPr>
+          <a:lstStyle/>
+          <a:p>
+            <a:r>
+              <a:rPr lang="en-US" dirty="0" smtClean="0"/>
+              <a:t>SPA Framework Requirements</a:t>
+            </a:r>
+            <a:endParaRPr lang="en-US" dirty="0"/>
+          </a:p>
+        </p:txBody>
+      </p:sp>
+      <p:sp>
+        <p:nvSpPr>
+          <p:cNvPr id="4" name="Date Placeholder 3"/>
+          <p:cNvSpPr>
+            <a:spLocks noGrp="1"/>
+          </p:cNvSpPr>
+          <p:nvPr>
+            <p:ph type="dt" sz="half" idx="2"/>
+          </p:nvPr>
+        </p:nvSpPr>
+        <p:spPr/>
+        <p:txBody>
+          <a:bodyPr/>
+          <a:lstStyle/>
+          <a:p>
+            <a:r>
+              <a:rPr lang="en-US" smtClean="0"/>
+              <a:t>May 7, 2014</a:t>
+            </a:r>
+            <a:endParaRPr lang="en-US"/>
+          </a:p>
+        </p:txBody>
+      </p:sp>
+      <p:sp>
+        <p:nvSpPr>
+          <p:cNvPr id="5" name="Footer Placeholder 4"/>
+          <p:cNvSpPr>
+            <a:spLocks noGrp="1"/>
+          </p:cNvSpPr>
+          <p:nvPr>
+            <p:ph type="ftr" sz="quarter" idx="3"/>
+          </p:nvPr>
+        </p:nvSpPr>
+        <p:spPr/>
+        <p:txBody>
+          <a:bodyPr/>
+          <a:lstStyle/>
+          <a:p>
+            <a:r>
+              <a:rPr lang="en-US" smtClean="0"/>
+              <a:t>2014 Guardian Software Developer Conference </a:t>
+            </a:r>
+            <a:endParaRPr lang="en-US" dirty="0"/>
+          </a:p>
+        </p:txBody>
+      </p:sp>
+      <p:sp>
+        <p:nvSpPr>
+          <p:cNvPr id="6" name="Slide Number Placeholder 5"/>
+          <p:cNvSpPr>
+            <a:spLocks noGrp="1"/>
+          </p:cNvSpPr>
+          <p:nvPr>
+            <p:ph type="sldNum" sz="quarter" idx="4"/>
+          </p:nvPr>
+        </p:nvSpPr>
+        <p:spPr/>
+        <p:txBody>
+          <a:bodyPr/>
+          <a:lstStyle/>
+          <a:p>
+            <a:fld id="{24A51D8B-51BA-45F9-A651-4243A6A9861C}" type="slidenum">
+              <a:rPr lang="en-US" smtClean="0"/>
+              <a:pPr/>
+              <a:t>7</a:t>
+            </a:fld>
+            <a:endParaRPr lang="en-US" dirty="0"/>
+          </a:p>
+        </p:txBody>
+      </p:sp>
+    </p:spTree>
+  </p:cSld>
+  <p:clrMapOvr>
+    <a:masterClrMapping/>
+  </p:clrMapOvr>
+  <p:timing>
+    <p:tnLst>
+      <p:par>
+        <p:cTn id="1" dur="indefinite" restart="never" nodeType="tmRoot"/>
+      </p:par>
+    </p:tnLst>
+  </p:timing>
+</p:sld>
+</file>
+
+<file path=ppt/slides/slide8.xml><?xml version="1.0" encoding="utf-8"?>
+<p:sld xmlns:a="http://schemas.openxmlformats.org/drawingml/2006/main" xmlns:r="http://schemas.openxmlformats.org/officeDocument/2006/relationships" xmlns:p="http://schemas.openxmlformats.org/presentationml/2006/main">
+  <p:cSld>
+    <p:spTree>
+      <p:nvGrpSpPr>
+        <p:cNvPr id="1" name=""/>
+        <p:cNvGrpSpPr/>
+        <p:nvPr/>
+      </p:nvGrpSpPr>
+      <p:grpSpPr>
+        <a:xfrm>
+          <a:off x="0" y="0"/>
+          <a:ext cx="0" cy="0"/>
+          <a:chOff x="0" y="0"/>
+          <a:chExt cx="0" cy="0"/>
+        </a:xfrm>
+      </p:grpSpPr>
+      <p:sp>
+        <p:nvSpPr>
+          <p:cNvPr id="2" name="Content Placeholder 1"/>
+          <p:cNvSpPr>
+            <a:spLocks noGrp="1"/>
+          </p:cNvSpPr>
+          <p:nvPr>
+            <p:ph idx="1"/>
+          </p:nvPr>
+        </p:nvSpPr>
+        <p:spPr/>
+        <p:txBody>
+          <a:bodyPr>
+            <a:normAutofit/>
+          </a:bodyPr>
+          <a:lstStyle/>
+          <a:p>
+            <a:pPr>
+              <a:spcAft>
+                <a:spcPts val="600"/>
+              </a:spcAft>
+            </a:pPr>
+            <a:r>
+              <a:rPr lang="en-US" dirty="0" smtClean="0"/>
+              <a:t>Mature &amp; </a:t>
+            </a:r>
+            <a:r>
+              <a:rPr lang="en-US" dirty="0" smtClean="0"/>
+              <a:t>robust MVC framework</a:t>
+            </a:r>
+            <a:endParaRPr lang="en-US" dirty="0" smtClean="0"/>
+          </a:p>
+          <a:p>
+            <a:pPr>
+              <a:spcAft>
+                <a:spcPts val="600"/>
+              </a:spcAft>
+            </a:pPr>
+            <a:r>
+              <a:rPr lang="en-US" dirty="0" smtClean="0"/>
+              <a:t>Active development</a:t>
+            </a:r>
+          </a:p>
+          <a:p>
+            <a:pPr>
+              <a:spcAft>
+                <a:spcPts val="600"/>
+              </a:spcAft>
+            </a:pPr>
+            <a:r>
+              <a:rPr lang="en-US" dirty="0" smtClean="0"/>
+              <a:t>Built to power large apps like Gmail</a:t>
+            </a:r>
+          </a:p>
+          <a:p>
+            <a:r>
+              <a:rPr lang="en-US" dirty="0" smtClean="0"/>
+              <a:t>Is a true “framework” not just a library</a:t>
+            </a:r>
+          </a:p>
+          <a:p>
+            <a:pPr lvl="1">
+              <a:spcAft>
+                <a:spcPts val="600"/>
+              </a:spcAft>
+            </a:pPr>
+            <a:r>
+              <a:rPr lang="en-US" dirty="0" smtClean="0"/>
+              <a:t>Provides majority of features needed in one framework rather than patchwork of several libraries</a:t>
+            </a:r>
+          </a:p>
+          <a:p>
+            <a:pPr>
+              <a:spcAft>
+                <a:spcPts val="600"/>
+              </a:spcAft>
+            </a:pPr>
+            <a:r>
+              <a:rPr lang="en-US" dirty="0" smtClean="0"/>
+              <a:t>Testable</a:t>
+            </a:r>
+            <a:endParaRPr lang="en-US" sz="1100" dirty="0" smtClean="0"/>
+          </a:p>
+          <a:p>
+            <a:pPr>
+              <a:spcAft>
+                <a:spcPts val="600"/>
+              </a:spcAft>
+            </a:pPr>
+            <a:r>
+              <a:rPr lang="en-US" dirty="0" smtClean="0"/>
+              <a:t>Most importantly, </a:t>
+            </a:r>
+            <a:r>
+              <a:rPr lang="en-US" b="1" dirty="0" smtClean="0"/>
+              <a:t>enjoyable!</a:t>
+            </a:r>
+          </a:p>
+        </p:txBody>
+      </p:sp>
+      <p:sp>
+        <p:nvSpPr>
+          <p:cNvPr id="3" name="Title 2"/>
+          <p:cNvSpPr>
+            <a:spLocks noGrp="1"/>
+          </p:cNvSpPr>
+          <p:nvPr>
+            <p:ph type="title"/>
+          </p:nvPr>
+        </p:nvSpPr>
+        <p:spPr/>
+        <p:txBody>
+          <a:bodyPr/>
+          <a:lstStyle/>
+          <a:p>
+            <a:r>
+              <a:rPr lang="en-US" smtClean="0"/>
+              <a:t>Why AngularJS?</a:t>
+            </a:r>
+            <a:endParaRPr lang="en-US" dirty="0"/>
+          </a:p>
+        </p:txBody>
+      </p:sp>
+      <p:sp>
+        <p:nvSpPr>
+          <p:cNvPr id="4" name="Date Placeholder 3"/>
+          <p:cNvSpPr>
+            <a:spLocks noGrp="1"/>
+          </p:cNvSpPr>
+          <p:nvPr>
+            <p:ph type="dt" sz="half" idx="2"/>
+          </p:nvPr>
+        </p:nvSpPr>
+        <p:spPr/>
+        <p:txBody>
+          <a:bodyPr/>
+          <a:lstStyle/>
+          <a:p>
+            <a:r>
+              <a:rPr lang="en-US" smtClean="0"/>
+              <a:t>May 7, 2014</a:t>
+            </a:r>
+            <a:endParaRPr lang="en-US"/>
+          </a:p>
+        </p:txBody>
+      </p:sp>
+      <p:sp>
+        <p:nvSpPr>
+          <p:cNvPr id="5" name="Footer Placeholder 4"/>
+          <p:cNvSpPr>
+            <a:spLocks noGrp="1"/>
+          </p:cNvSpPr>
+          <p:nvPr>
+            <p:ph type="ftr" sz="quarter" idx="3"/>
+          </p:nvPr>
+        </p:nvSpPr>
+        <p:spPr/>
+        <p:txBody>
+          <a:bodyPr/>
+          <a:lstStyle/>
+          <a:p>
+            <a:r>
+              <a:rPr lang="en-US" smtClean="0"/>
+              <a:t>2014 Guardian Software Developer Conference </a:t>
+            </a:r>
+            <a:endParaRPr lang="en-US" dirty="0"/>
+          </a:p>
+        </p:txBody>
+      </p:sp>
+      <p:sp>
+        <p:nvSpPr>
+          <p:cNvPr id="6" name="Slide Number Placeholder 5"/>
+          <p:cNvSpPr>
+            <a:spLocks noGrp="1"/>
+          </p:cNvSpPr>
+          <p:nvPr>
+            <p:ph type="sldNum" sz="quarter" idx="4"/>
+          </p:nvPr>
+        </p:nvSpPr>
+        <p:spPr/>
+        <p:txBody>
+          <a:bodyPr/>
+          <a:lstStyle/>
+          <a:p>
+            <a:fld id="{24A51D8B-51BA-45F9-A651-4243A6A9861C}" type="slidenum">
+              <a:rPr lang="en-US" smtClean="0"/>
+              <a:pPr/>
+              <a:t>8</a:t>
+            </a:fld>
+            <a:endParaRPr lang="en-US" dirty="0"/>
+          </a:p>
+        </p:txBody>
+      </p:sp>
+    </p:spTree>
+  </p:cSld>
+  <p:clrMapOvr>
+    <a:masterClrMapping/>
+  </p:clrMapOvr>
+  <p:timing>
+    <p:tnLst>
+      <p:par>
+        <p:cTn id="1" dur="indefinite" restart="never" nodeType="tmRoot"/>
+      </p:par>
+    </p:tnLst>
+  </p:timing>
+</p:sld>
+</file>
+
+<file path=ppt/slides/slide9.xml><?xml version="1.0" encoding="utf-8"?>
+<p:sld xmlns:a="http://schemas.openxmlformats.org/drawingml/2006/main" xmlns:r="http://schemas.openxmlformats.org/officeDocument/2006/relationships" xmlns:p="http://schemas.openxmlformats.org/presentationml/2006/main">
+  <p:cSld>
+    <p:spTree>
+      <p:nvGrpSpPr>
+        <p:cNvPr id="1" name=""/>
+        <p:cNvGrpSpPr/>
+        <p:nvPr/>
+      </p:nvGrpSpPr>
+      <p:grpSpPr>
+        <a:xfrm>
+          <a:off x="0" y="0"/>
+          <a:ext cx="0" cy="0"/>
+          <a:chOff x="0" y="0"/>
+          <a:chExt cx="0" cy="0"/>
+        </a:xfrm>
+      </p:grpSpPr>
+      <p:sp>
+        <p:nvSpPr>
+          <p:cNvPr id="2" name="Content Placeholder 1"/>
+          <p:cNvSpPr>
+            <a:spLocks noGrp="1"/>
+          </p:cNvSpPr>
+          <p:nvPr>
+            <p:ph idx="1"/>
+          </p:nvPr>
+        </p:nvSpPr>
+        <p:spPr/>
+        <p:txBody>
+          <a:bodyPr/>
+          <a:lstStyle/>
+          <a:p>
+            <a:r>
+              <a:rPr lang="en-US" smtClean="0">
+                <a:hlinkClick r:id="rId3"/>
+              </a:rPr>
+              <a:t>https://angularjs.org/</a:t>
+            </a:r>
+            <a:endParaRPr lang="en-US" smtClean="0"/>
+          </a:p>
+          <a:p>
+            <a:endParaRPr lang="en-US" smtClean="0"/>
+          </a:p>
+          <a:p>
+            <a:r>
+              <a:rPr lang="en-US" smtClean="0"/>
+              <a:t>Start with open mind</a:t>
+            </a:r>
+          </a:p>
+          <a:p>
+            <a:r>
+              <a:rPr lang="en-US" smtClean="0"/>
+              <a:t>More similar to thick client or mobile app</a:t>
+            </a:r>
+          </a:p>
+          <a:p>
+            <a:r>
+              <a:rPr lang="en-US" smtClean="0"/>
+              <a:t>Learn to love Javascript!</a:t>
+            </a:r>
+          </a:p>
+          <a:p>
+            <a:endParaRPr lang="en-US" smtClean="0"/>
+          </a:p>
+          <a:p>
+            <a:r>
+              <a:rPr lang="en-US" smtClean="0"/>
+              <a:t>Start simple, don’t boil the SPA ocean all at once</a:t>
+            </a:r>
+          </a:p>
+          <a:p>
+            <a:pPr lvl="1"/>
+            <a:r>
+              <a:rPr lang="en-US" smtClean="0"/>
+              <a:t>Learn one framework at a time, then add others as needed</a:t>
+            </a:r>
+          </a:p>
+          <a:p>
+            <a:endParaRPr lang="en-US" smtClean="0"/>
+          </a:p>
+          <a:p>
+            <a:endParaRPr lang="en-US" dirty="0"/>
+          </a:p>
+        </p:txBody>
+      </p:sp>
+      <p:sp>
+        <p:nvSpPr>
+          <p:cNvPr id="3" name="Title 2"/>
+          <p:cNvSpPr>
+            <a:spLocks noGrp="1"/>
+          </p:cNvSpPr>
+          <p:nvPr>
+            <p:ph type="title"/>
+          </p:nvPr>
+        </p:nvSpPr>
+        <p:spPr/>
+        <p:txBody>
+          <a:bodyPr/>
+          <a:lstStyle/>
+          <a:p>
+            <a:r>
+              <a:rPr lang="en-US" smtClean="0"/>
+              <a:t>Getting Started</a:t>
+            </a:r>
+            <a:endParaRPr lang="en-US" dirty="0"/>
+          </a:p>
+        </p:txBody>
+      </p:sp>
+      <p:sp>
+        <p:nvSpPr>
+          <p:cNvPr id="4" name="Date Placeholder 3"/>
+          <p:cNvSpPr>
+            <a:spLocks noGrp="1"/>
+          </p:cNvSpPr>
+          <p:nvPr>
+            <p:ph type="dt" sz="half" idx="2"/>
+          </p:nvPr>
+        </p:nvSpPr>
+        <p:spPr/>
+        <p:txBody>
+          <a:bodyPr/>
+          <a:lstStyle/>
+          <a:p>
+            <a:r>
+              <a:rPr lang="en-US" smtClean="0"/>
+              <a:t>May 7, 2014</a:t>
+            </a:r>
+            <a:endParaRPr lang="en-US"/>
+          </a:p>
+        </p:txBody>
+      </p:sp>
+      <p:sp>
+        <p:nvSpPr>
+          <p:cNvPr id="5" name="Footer Placeholder 4"/>
+          <p:cNvSpPr>
+            <a:spLocks noGrp="1"/>
+          </p:cNvSpPr>
+          <p:nvPr>
+            <p:ph type="ftr" sz="quarter" idx="3"/>
+          </p:nvPr>
+        </p:nvSpPr>
+        <p:spPr/>
+        <p:txBody>
+          <a:bodyPr/>
+          <a:lstStyle/>
+          <a:p>
+            <a:r>
+              <a:rPr lang="en-US" smtClean="0"/>
+              <a:t>2014 Guardian Software Developer Conference </a:t>
+            </a:r>
+            <a:endParaRPr lang="en-US" dirty="0"/>
+          </a:p>
+        </p:txBody>
+      </p:sp>
+      <p:sp>
+        <p:nvSpPr>
+          <p:cNvPr id="6" name="Slide Number Placeholder 5"/>
+          <p:cNvSpPr>
+            <a:spLocks noGrp="1"/>
+          </p:cNvSpPr>
+          <p:nvPr>
+            <p:ph type="sldNum" sz="quarter" idx="4"/>
+          </p:nvPr>
+        </p:nvSpPr>
+        <p:spPr/>
+        <p:txBody>
+          <a:bodyPr/>
+          <a:lstStyle/>
+          <a:p>
+            <a:fld id="{24A51D8B-51BA-45F9-A651-4243A6A9861C}" type="slidenum">
+              <a:rPr lang="en-US" smtClean="0"/>
+              <a:pPr/>
+              <a:t>9</a:t>
+            </a:fld>
+            <a:endParaRPr lang="en-US" dirty="0"/>
+          </a:p>
+        </p:txBody>
+      </p:sp>
+    </p:spTree>
+  </p:cSld>
+  <p:clrMapOvr>
+    <a:masterClrMapping/>
+  </p:clrMapOvr>
+  <p:timing>
+    <p:tnLst>
+      <p:par>
+        <p:cTn id="1" dur="indefinite" restart="never" nodeType="tmRoot"/>
+      </p:par>
+    </p:tnLst>
+  </p:timing>
 </p:sld>
 </file>
 

</xml_diff>

<commit_message>
Added session details page
</commit_message>
<xml_diff>
--- a/intro-to-angular-js.pptx
+++ b/intro-to-angular-js.pptx
@@ -5,7 +5,7 @@
     <p:sldMasterId id="2147483828" r:id="rId1"/>
   </p:sldMasterIdLst>
   <p:notesMasterIdLst>
-    <p:notesMasterId r:id="rId14"/>
+    <p:notesMasterId r:id="rId17"/>
   </p:notesMasterIdLst>
   <p:sldIdLst>
     <p:sldId id="256" r:id="rId2"/>
@@ -19,7 +19,10 @@
     <p:sldId id="259" r:id="rId10"/>
     <p:sldId id="260" r:id="rId11"/>
     <p:sldId id="266" r:id="rId12"/>
-    <p:sldId id="261" r:id="rId13"/>
+    <p:sldId id="268" r:id="rId13"/>
+    <p:sldId id="269" r:id="rId14"/>
+    <p:sldId id="270" r:id="rId15"/>
+    <p:sldId id="261" r:id="rId16"/>
   </p:sldIdLst>
   <p:sldSz cx="9144000" cy="6858000" type="screen4x3"/>
   <p:notesSz cx="6858000" cy="9144000"/>
@@ -204,7 +207,7 @@
             <a:fld id="{A60B08C5-9C7E-4233-A42F-8078A6F8DA9D}" type="datetimeFigureOut">
               <a:rPr lang="en-US" smtClean="0"/>
               <a:pPr/>
-              <a:t>5/2/2014</a:t>
+              <a:t>5/6/2014</a:t>
             </a:fld>
             <a:endParaRPr lang="en-US"/>
           </a:p>
@@ -373,7 +376,7 @@
     </p:spTree>
     <p:extLst>
       <p:ext uri="{BB962C8B-B14F-4D97-AF65-F5344CB8AC3E}">
-        <p14:creationId xmlns="" xmlns:p14="http://schemas.microsoft.com/office/powerpoint/2010/main" val="2181301"/>
+        <p14:creationId xmlns:p14="http://schemas.microsoft.com/office/powerpoint/2010/main" xmlns="" val="2181301"/>
       </p:ext>
     </p:extLst>
   </p:cSld>
@@ -2719,13 +2722,8 @@
           <a:p>
             <a:r>
               <a:rPr lang="en-US" dirty="0" smtClean="0"/>
-              <a:t>Guardian, BTS Disability (BRO</a:t>
-            </a:r>
-            <a:r>
-              <a:rPr lang="en-US" dirty="0" smtClean="0"/>
-              <a:t>)</a:t>
-            </a:r>
-            <a:endParaRPr lang="en-US" dirty="0" smtClean="0"/>
+              <a:t>Guardian, BTS Disability (BRO)</a:t>
+            </a:r>
           </a:p>
           <a:p>
             <a:endParaRPr lang="en-US" dirty="0"/>
@@ -2735,7 +2733,7 @@
     </p:spTree>
     <p:extLst>
       <p:ext uri="{BB962C8B-B14F-4D97-AF65-F5344CB8AC3E}">
-        <p14:creationId xmlns="" xmlns:p14="http://schemas.microsoft.com/office/powerpoint/2010/main" val="2379396099"/>
+        <p14:creationId xmlns:p14="http://schemas.microsoft.com/office/powerpoint/2010/main" xmlns="" val="2379396099"/>
       </p:ext>
     </p:extLst>
   </p:cSld>
@@ -3020,13 +3018,7 @@
               <a:rPr lang="en-US" sz="2600" dirty="0" smtClean="0">
                 <a:hlinkClick r:id="rId2"/>
               </a:rPr>
-              <a:t>https://</a:t>
-            </a:r>
-            <a:r>
-              <a:rPr lang="en-US" sz="2600" dirty="0" smtClean="0">
-                <a:hlinkClick r:id="rId2"/>
-              </a:rPr>
-              <a:t>github.com/jbellmore/GSDC-2014-AngularJS</a:t>
+              <a:t>https://github.com/jbellmore/GSDC-2014-AngularJS</a:t>
             </a:r>
             <a:endParaRPr lang="en-US" sz="2600" dirty="0" smtClean="0"/>
           </a:p>
@@ -3169,65 +3161,762 @@
         </p:nvSpPr>
         <p:spPr/>
         <p:txBody>
-          <a:bodyPr/>
-          <a:lstStyle/>
-          <a:p>
-            <a:r>
-              <a:rPr lang="de-DE" dirty="0" smtClean="0">
+          <a:bodyPr>
+            <a:normAutofit/>
+          </a:bodyPr>
+          <a:lstStyle/>
+          <a:p>
+            <a:r>
+              <a:rPr lang="en-US" dirty="0" smtClean="0"/>
+              <a:t>Used on the Disability AUS project</a:t>
+            </a:r>
+          </a:p>
+          <a:p>
+            <a:pPr lvl="1"/>
+            <a:r>
+              <a:rPr lang="en-US" dirty="0" smtClean="0"/>
+              <a:t>Lines of Code:</a:t>
+            </a:r>
+          </a:p>
+          <a:p>
+            <a:pPr lvl="2">
+              <a:buFont typeface="Arial" pitchFamily="34" charset="0"/>
+              <a:buChar char="•"/>
+            </a:pPr>
+            <a:r>
+              <a:rPr lang="en-US" sz="2400" i="1" dirty="0" smtClean="0"/>
+              <a:t>43,536 </a:t>
+            </a:r>
+            <a:r>
+              <a:rPr lang="en-US" sz="2400" i="1" dirty="0" smtClean="0"/>
+              <a:t>- C</a:t>
+            </a:r>
+            <a:r>
+              <a:rPr lang="en-US" sz="2400" i="1" dirty="0" smtClean="0"/>
+              <a:t>#/.</a:t>
+            </a:r>
+            <a:r>
+              <a:rPr lang="en-US" sz="2400" i="1" dirty="0" smtClean="0"/>
+              <a:t>NET</a:t>
+            </a:r>
+          </a:p>
+          <a:p>
+            <a:pPr lvl="2">
+              <a:buFont typeface="Arial" pitchFamily="34" charset="0"/>
+              <a:buChar char="•"/>
+            </a:pPr>
+            <a:r>
+              <a:rPr lang="en-US" sz="2400" i="1" dirty="0" smtClean="0"/>
+              <a:t>8,109 - JavaScript</a:t>
+            </a:r>
+          </a:p>
+          <a:p>
+            <a:pPr lvl="2">
+              <a:buFont typeface="Arial" pitchFamily="34" charset="0"/>
+              <a:buChar char="•"/>
+            </a:pPr>
+            <a:r>
+              <a:rPr lang="en-US" sz="2400" i="1" dirty="0" smtClean="0"/>
+              <a:t>7,081 - HTML</a:t>
+            </a:r>
+          </a:p>
+          <a:p>
+            <a:pPr lvl="2">
+              <a:buFont typeface="Arial" pitchFamily="34" charset="0"/>
+              <a:buChar char="•"/>
+            </a:pPr>
+            <a:r>
+              <a:rPr lang="en-US" sz="2400" i="1" dirty="0" smtClean="0"/>
+              <a:t>537 - CSS</a:t>
+            </a:r>
+          </a:p>
+          <a:p>
+            <a:pPr lvl="1"/>
+            <a:r>
+              <a:rPr lang="en-US" sz="2600" i="1" dirty="0" smtClean="0"/>
+              <a:t>~ 40 states/views defined nested several levels deep</a:t>
+            </a:r>
+            <a:endParaRPr lang="en-US" sz="2600" dirty="0" smtClean="0"/>
+          </a:p>
+          <a:p>
+            <a:pPr lvl="1">
+              <a:buNone/>
+            </a:pPr>
+            <a:endParaRPr lang="en-US" sz="1000" dirty="0" smtClean="0"/>
+          </a:p>
+          <a:p>
+            <a:r>
+              <a:rPr lang="en-US" dirty="0" smtClean="0"/>
+              <a:t>Around 10 months development time</a:t>
+            </a:r>
+          </a:p>
+          <a:p>
+            <a:pPr lvl="1"/>
+            <a:r>
+              <a:rPr lang="en-US" dirty="0" smtClean="0"/>
+              <a:t>Roughly 6 core developers</a:t>
+            </a:r>
+            <a:endParaRPr lang="en-US" dirty="0"/>
+          </a:p>
+        </p:txBody>
+      </p:sp>
+      <p:sp>
+        <p:nvSpPr>
+          <p:cNvPr id="3" name="Title 2"/>
+          <p:cNvSpPr>
+            <a:spLocks noGrp="1"/>
+          </p:cNvSpPr>
+          <p:nvPr>
+            <p:ph type="title"/>
+          </p:nvPr>
+        </p:nvSpPr>
+        <p:spPr/>
+        <p:txBody>
+          <a:bodyPr/>
+          <a:lstStyle/>
+          <a:p>
+            <a:r>
+              <a:rPr lang="en-US" dirty="0" smtClean="0"/>
+              <a:t>Angular in Guardian</a:t>
+            </a:r>
+            <a:endParaRPr lang="en-US" dirty="0"/>
+          </a:p>
+        </p:txBody>
+      </p:sp>
+      <p:sp>
+        <p:nvSpPr>
+          <p:cNvPr id="4" name="Date Placeholder 3"/>
+          <p:cNvSpPr>
+            <a:spLocks noGrp="1"/>
+          </p:cNvSpPr>
+          <p:nvPr>
+            <p:ph type="dt" sz="half" idx="2"/>
+          </p:nvPr>
+        </p:nvSpPr>
+        <p:spPr/>
+        <p:txBody>
+          <a:bodyPr/>
+          <a:lstStyle/>
+          <a:p>
+            <a:r>
+              <a:rPr lang="en-US" smtClean="0"/>
+              <a:t>May 7, 2014</a:t>
+            </a:r>
+            <a:endParaRPr lang="en-US"/>
+          </a:p>
+        </p:txBody>
+      </p:sp>
+      <p:sp>
+        <p:nvSpPr>
+          <p:cNvPr id="5" name="Footer Placeholder 4"/>
+          <p:cNvSpPr>
+            <a:spLocks noGrp="1"/>
+          </p:cNvSpPr>
+          <p:nvPr>
+            <p:ph type="ftr" sz="quarter" idx="3"/>
+          </p:nvPr>
+        </p:nvSpPr>
+        <p:spPr/>
+        <p:txBody>
+          <a:bodyPr/>
+          <a:lstStyle/>
+          <a:p>
+            <a:r>
+              <a:rPr lang="en-US" smtClean="0"/>
+              <a:t>2014 Guardian Software Developer Conference </a:t>
+            </a:r>
+            <a:endParaRPr lang="en-US" dirty="0"/>
+          </a:p>
+        </p:txBody>
+      </p:sp>
+      <p:sp>
+        <p:nvSpPr>
+          <p:cNvPr id="6" name="Slide Number Placeholder 5"/>
+          <p:cNvSpPr>
+            <a:spLocks noGrp="1"/>
+          </p:cNvSpPr>
+          <p:nvPr>
+            <p:ph type="sldNum" sz="quarter" idx="4"/>
+          </p:nvPr>
+        </p:nvSpPr>
+        <p:spPr/>
+        <p:txBody>
+          <a:bodyPr/>
+          <a:lstStyle/>
+          <a:p>
+            <a:fld id="{24A51D8B-51BA-45F9-A651-4243A6A9861C}" type="slidenum">
+              <a:rPr lang="en-US" smtClean="0"/>
+              <a:pPr/>
+              <a:t>12</a:t>
+            </a:fld>
+            <a:endParaRPr lang="en-US" dirty="0"/>
+          </a:p>
+        </p:txBody>
+      </p:sp>
+    </p:spTree>
+  </p:cSld>
+  <p:clrMapOvr>
+    <a:masterClrMapping/>
+  </p:clrMapOvr>
+  <p:timing>
+    <p:tnLst>
+      <p:par>
+        <p:cTn id="1" dur="indefinite" restart="never" nodeType="tmRoot"/>
+      </p:par>
+    </p:tnLst>
+  </p:timing>
+</p:sld>
+</file>
+
+<file path=ppt/slides/slide13.xml><?xml version="1.0" encoding="utf-8"?>
+<p:sld xmlns:a="http://schemas.openxmlformats.org/drawingml/2006/main" xmlns:r="http://schemas.openxmlformats.org/officeDocument/2006/relationships" xmlns:p="http://schemas.openxmlformats.org/presentationml/2006/main">
+  <p:cSld>
+    <p:spTree>
+      <p:nvGrpSpPr>
+        <p:cNvPr id="1" name=""/>
+        <p:cNvGrpSpPr/>
+        <p:nvPr/>
+      </p:nvGrpSpPr>
+      <p:grpSpPr>
+        <a:xfrm>
+          <a:off x="0" y="0"/>
+          <a:ext cx="0" cy="0"/>
+          <a:chOff x="0" y="0"/>
+          <a:chExt cx="0" cy="0"/>
+        </a:xfrm>
+      </p:grpSpPr>
+      <p:sp>
+        <p:nvSpPr>
+          <p:cNvPr id="2" name="Content Placeholder 1"/>
+          <p:cNvSpPr>
+            <a:spLocks noGrp="1"/>
+          </p:cNvSpPr>
+          <p:nvPr>
+            <p:ph idx="1"/>
+          </p:nvPr>
+        </p:nvSpPr>
+        <p:spPr/>
+        <p:txBody>
+          <a:bodyPr/>
+          <a:lstStyle/>
+          <a:p>
+            <a:r>
+              <a:rPr lang="en-US" dirty="0" smtClean="0"/>
+              <a:t>Authentication/authorization </a:t>
+            </a:r>
+            <a:r>
+              <a:rPr lang="en-US" dirty="0" smtClean="0"/>
+              <a:t>via </a:t>
+            </a:r>
+            <a:r>
+              <a:rPr lang="en-US" dirty="0" err="1" smtClean="0"/>
+              <a:t>Webseal</a:t>
+            </a:r>
+            <a:endParaRPr lang="en-US" dirty="0" smtClean="0"/>
+          </a:p>
+          <a:p>
+            <a:pPr lvl="1"/>
+            <a:r>
+              <a:rPr lang="en-US" sz="2200" dirty="0" smtClean="0"/>
+              <a:t>Solved with cookie based custom ASP.NET </a:t>
+            </a:r>
+            <a:r>
+              <a:rPr lang="en-US" sz="2200" dirty="0" smtClean="0"/>
+              <a:t>provider</a:t>
+            </a:r>
+          </a:p>
+          <a:p>
+            <a:pPr lvl="1"/>
+            <a:endParaRPr lang="en-US" sz="2000" dirty="0" smtClean="0"/>
+          </a:p>
+          <a:p>
+            <a:r>
+              <a:rPr lang="en-US" sz="2700" dirty="0" err="1" smtClean="0"/>
+              <a:t>mVC</a:t>
+            </a:r>
+            <a:r>
+              <a:rPr lang="en-US" sz="2700" dirty="0" smtClean="0"/>
+              <a:t> framework – must implement your own “model</a:t>
+            </a:r>
+            <a:r>
+              <a:rPr lang="en-US" sz="2700" dirty="0" smtClean="0"/>
+              <a:t>”</a:t>
+            </a:r>
+          </a:p>
+          <a:p>
+            <a:endParaRPr lang="en-US" sz="2000" dirty="0" smtClean="0"/>
+          </a:p>
+          <a:p>
+            <a:r>
+              <a:rPr lang="en-US" dirty="0" smtClean="0"/>
+              <a:t>Duplication of REST </a:t>
+            </a:r>
+            <a:r>
+              <a:rPr lang="en-US" dirty="0" err="1" smtClean="0"/>
+              <a:t>api</a:t>
+            </a:r>
+            <a:r>
+              <a:rPr lang="en-US" dirty="0" smtClean="0"/>
+              <a:t> calls - </a:t>
+            </a:r>
+            <a:r>
+              <a:rPr lang="en-US" b="1" dirty="0" smtClean="0"/>
+              <a:t>Use Services!</a:t>
+            </a:r>
+          </a:p>
+          <a:p>
+            <a:pPr lvl="1"/>
+            <a:r>
+              <a:rPr lang="en-US" sz="2200" dirty="0" smtClean="0"/>
+              <a:t>Client side caching?</a:t>
+            </a:r>
+          </a:p>
+          <a:p>
+            <a:pPr lvl="1"/>
+            <a:endParaRPr lang="en-US" sz="1000" dirty="0" smtClean="0"/>
+          </a:p>
+        </p:txBody>
+      </p:sp>
+      <p:sp>
+        <p:nvSpPr>
+          <p:cNvPr id="3" name="Title 2"/>
+          <p:cNvSpPr>
+            <a:spLocks noGrp="1"/>
+          </p:cNvSpPr>
+          <p:nvPr>
+            <p:ph type="title"/>
+          </p:nvPr>
+        </p:nvSpPr>
+        <p:spPr/>
+        <p:txBody>
+          <a:bodyPr/>
+          <a:lstStyle/>
+          <a:p>
+            <a:r>
+              <a:rPr lang="en-US" dirty="0" smtClean="0"/>
+              <a:t>Lessons Learned</a:t>
+            </a:r>
+            <a:endParaRPr lang="en-US" dirty="0"/>
+          </a:p>
+        </p:txBody>
+      </p:sp>
+      <p:sp>
+        <p:nvSpPr>
+          <p:cNvPr id="4" name="Date Placeholder 3"/>
+          <p:cNvSpPr>
+            <a:spLocks noGrp="1"/>
+          </p:cNvSpPr>
+          <p:nvPr>
+            <p:ph type="dt" sz="half" idx="2"/>
+          </p:nvPr>
+        </p:nvSpPr>
+        <p:spPr/>
+        <p:txBody>
+          <a:bodyPr/>
+          <a:lstStyle/>
+          <a:p>
+            <a:r>
+              <a:rPr lang="en-US" smtClean="0"/>
+              <a:t>May 7, 2014</a:t>
+            </a:r>
+            <a:endParaRPr lang="en-US"/>
+          </a:p>
+        </p:txBody>
+      </p:sp>
+      <p:sp>
+        <p:nvSpPr>
+          <p:cNvPr id="5" name="Footer Placeholder 4"/>
+          <p:cNvSpPr>
+            <a:spLocks noGrp="1"/>
+          </p:cNvSpPr>
+          <p:nvPr>
+            <p:ph type="ftr" sz="quarter" idx="3"/>
+          </p:nvPr>
+        </p:nvSpPr>
+        <p:spPr/>
+        <p:txBody>
+          <a:bodyPr/>
+          <a:lstStyle/>
+          <a:p>
+            <a:r>
+              <a:rPr lang="en-US" smtClean="0"/>
+              <a:t>2014 Guardian Software Developer Conference </a:t>
+            </a:r>
+            <a:endParaRPr lang="en-US" dirty="0"/>
+          </a:p>
+        </p:txBody>
+      </p:sp>
+      <p:sp>
+        <p:nvSpPr>
+          <p:cNvPr id="6" name="Slide Number Placeholder 5"/>
+          <p:cNvSpPr>
+            <a:spLocks noGrp="1"/>
+          </p:cNvSpPr>
+          <p:nvPr>
+            <p:ph type="sldNum" sz="quarter" idx="4"/>
+          </p:nvPr>
+        </p:nvSpPr>
+        <p:spPr/>
+        <p:txBody>
+          <a:bodyPr/>
+          <a:lstStyle/>
+          <a:p>
+            <a:fld id="{24A51D8B-51BA-45F9-A651-4243A6A9861C}" type="slidenum">
+              <a:rPr lang="en-US" smtClean="0"/>
+              <a:pPr/>
+              <a:t>13</a:t>
+            </a:fld>
+            <a:endParaRPr lang="en-US" dirty="0"/>
+          </a:p>
+        </p:txBody>
+      </p:sp>
+    </p:spTree>
+  </p:cSld>
+  <p:clrMapOvr>
+    <a:masterClrMapping/>
+  </p:clrMapOvr>
+</p:sld>
+</file>
+
+<file path=ppt/slides/slide14.xml><?xml version="1.0" encoding="utf-8"?>
+<p:sld xmlns:a="http://schemas.openxmlformats.org/drawingml/2006/main" xmlns:r="http://schemas.openxmlformats.org/officeDocument/2006/relationships" xmlns:p="http://schemas.openxmlformats.org/presentationml/2006/main">
+  <p:cSld>
+    <p:spTree>
+      <p:nvGrpSpPr>
+        <p:cNvPr id="1" name=""/>
+        <p:cNvGrpSpPr/>
+        <p:nvPr/>
+      </p:nvGrpSpPr>
+      <p:grpSpPr>
+        <a:xfrm>
+          <a:off x="0" y="0"/>
+          <a:ext cx="0" cy="0"/>
+          <a:chOff x="0" y="0"/>
+          <a:chExt cx="0" cy="0"/>
+        </a:xfrm>
+      </p:grpSpPr>
+      <p:sp>
+        <p:nvSpPr>
+          <p:cNvPr id="2" name="Content Placeholder 1"/>
+          <p:cNvSpPr>
+            <a:spLocks noGrp="1"/>
+          </p:cNvSpPr>
+          <p:nvPr>
+            <p:ph idx="1"/>
+          </p:nvPr>
+        </p:nvSpPr>
+        <p:spPr/>
+        <p:txBody>
+          <a:bodyPr/>
+          <a:lstStyle/>
+          <a:p>
+            <a:r>
+              <a:rPr lang="en-US" sz="2700" dirty="0" smtClean="0"/>
+              <a:t>Learn about the </a:t>
+            </a:r>
+            <a:r>
+              <a:rPr lang="en-US" sz="2700" b="1" dirty="0" smtClean="0"/>
+              <a:t>$digest </a:t>
+            </a:r>
+            <a:r>
+              <a:rPr lang="en-US" sz="2700" dirty="0" smtClean="0"/>
+              <a:t>&amp; data binding cycle</a:t>
+            </a:r>
+          </a:p>
+          <a:p>
+            <a:pPr lvl="1"/>
+            <a:r>
+              <a:rPr lang="en-US" sz="2200" dirty="0" smtClean="0"/>
+              <a:t>Avoid non-Angular DOM manipulation</a:t>
+            </a:r>
+          </a:p>
+          <a:p>
+            <a:endParaRPr lang="en-US" sz="1000" dirty="0" smtClean="0"/>
+          </a:p>
+          <a:p>
+            <a:r>
+              <a:rPr lang="en-US" sz="2700" dirty="0" smtClean="0"/>
+              <a:t>Avoid </a:t>
+            </a:r>
+            <a:r>
+              <a:rPr lang="en-US" sz="2700" dirty="0" smtClean="0"/>
+              <a:t>use of $scope inheritance</a:t>
+            </a:r>
+          </a:p>
+          <a:p>
+            <a:pPr lvl="1"/>
+            <a:r>
+              <a:rPr lang="en-US" dirty="0" smtClean="0"/>
+              <a:t>Tight coupling</a:t>
+            </a:r>
+          </a:p>
+          <a:p>
+            <a:pPr lvl="1"/>
+            <a:r>
+              <a:rPr lang="en-US" dirty="0" smtClean="0"/>
+              <a:t>Use events instead (</a:t>
+            </a:r>
+            <a:r>
+              <a:rPr lang="en-US" b="1" dirty="0" smtClean="0"/>
+              <a:t>$broadcast</a:t>
+            </a:r>
+            <a:r>
+              <a:rPr lang="en-US" dirty="0" smtClean="0"/>
+              <a:t> and </a:t>
+            </a:r>
+            <a:r>
+              <a:rPr lang="en-US" b="1" dirty="0" smtClean="0"/>
+              <a:t>$on</a:t>
+            </a:r>
+            <a:r>
+              <a:rPr lang="en-US" dirty="0" smtClean="0"/>
+              <a:t>)</a:t>
+            </a:r>
+          </a:p>
+          <a:p>
+            <a:pPr lvl="1"/>
+            <a:endParaRPr lang="en-US" sz="1000" dirty="0" smtClean="0"/>
+          </a:p>
+          <a:p>
+            <a:r>
+              <a:rPr lang="en-US" dirty="0" smtClean="0"/>
+              <a:t>Avoid “scope soup”</a:t>
+            </a:r>
+          </a:p>
+          <a:p>
+            <a:pPr lvl="1"/>
+            <a:r>
+              <a:rPr lang="en-US" dirty="0" smtClean="0"/>
+              <a:t>Keeps code DRY</a:t>
+            </a:r>
+          </a:p>
+          <a:p>
+            <a:pPr lvl="1"/>
+            <a:endParaRPr lang="en-US" dirty="0"/>
+          </a:p>
+        </p:txBody>
+      </p:sp>
+      <p:sp>
+        <p:nvSpPr>
+          <p:cNvPr id="3" name="Title 2"/>
+          <p:cNvSpPr>
+            <a:spLocks noGrp="1"/>
+          </p:cNvSpPr>
+          <p:nvPr>
+            <p:ph type="title"/>
+          </p:nvPr>
+        </p:nvSpPr>
+        <p:spPr/>
+        <p:txBody>
+          <a:bodyPr/>
+          <a:lstStyle/>
+          <a:p>
+            <a:r>
+              <a:rPr lang="en-US" dirty="0" smtClean="0"/>
+              <a:t>Lessons Learned Cont.</a:t>
+            </a:r>
+            <a:endParaRPr lang="en-US" dirty="0"/>
+          </a:p>
+        </p:txBody>
+      </p:sp>
+      <p:sp>
+        <p:nvSpPr>
+          <p:cNvPr id="4" name="Date Placeholder 3"/>
+          <p:cNvSpPr>
+            <a:spLocks noGrp="1"/>
+          </p:cNvSpPr>
+          <p:nvPr>
+            <p:ph type="dt" sz="half" idx="2"/>
+          </p:nvPr>
+        </p:nvSpPr>
+        <p:spPr/>
+        <p:txBody>
+          <a:bodyPr/>
+          <a:lstStyle/>
+          <a:p>
+            <a:r>
+              <a:rPr lang="en-US" smtClean="0"/>
+              <a:t>May 7, 2014</a:t>
+            </a:r>
+            <a:endParaRPr lang="en-US"/>
+          </a:p>
+        </p:txBody>
+      </p:sp>
+      <p:sp>
+        <p:nvSpPr>
+          <p:cNvPr id="5" name="Footer Placeholder 4"/>
+          <p:cNvSpPr>
+            <a:spLocks noGrp="1"/>
+          </p:cNvSpPr>
+          <p:nvPr>
+            <p:ph type="ftr" sz="quarter" idx="3"/>
+          </p:nvPr>
+        </p:nvSpPr>
+        <p:spPr/>
+        <p:txBody>
+          <a:bodyPr/>
+          <a:lstStyle/>
+          <a:p>
+            <a:r>
+              <a:rPr lang="en-US" smtClean="0"/>
+              <a:t>2014 Guardian Software Developer Conference </a:t>
+            </a:r>
+            <a:endParaRPr lang="en-US" dirty="0"/>
+          </a:p>
+        </p:txBody>
+      </p:sp>
+      <p:sp>
+        <p:nvSpPr>
+          <p:cNvPr id="6" name="Slide Number Placeholder 5"/>
+          <p:cNvSpPr>
+            <a:spLocks noGrp="1"/>
+          </p:cNvSpPr>
+          <p:nvPr>
+            <p:ph type="sldNum" sz="quarter" idx="4"/>
+          </p:nvPr>
+        </p:nvSpPr>
+        <p:spPr/>
+        <p:txBody>
+          <a:bodyPr/>
+          <a:lstStyle/>
+          <a:p>
+            <a:fld id="{24A51D8B-51BA-45F9-A651-4243A6A9861C}" type="slidenum">
+              <a:rPr lang="en-US" smtClean="0"/>
+              <a:pPr/>
+              <a:t>14</a:t>
+            </a:fld>
+            <a:endParaRPr lang="en-US" dirty="0"/>
+          </a:p>
+        </p:txBody>
+      </p:sp>
+    </p:spTree>
+  </p:cSld>
+  <p:clrMapOvr>
+    <a:masterClrMapping/>
+  </p:clrMapOvr>
+</p:sld>
+</file>
+
+<file path=ppt/slides/slide15.xml><?xml version="1.0" encoding="utf-8"?>
+<p:sld xmlns:a="http://schemas.openxmlformats.org/drawingml/2006/main" xmlns:r="http://schemas.openxmlformats.org/officeDocument/2006/relationships" xmlns:p="http://schemas.openxmlformats.org/presentationml/2006/main">
+  <p:cSld>
+    <p:spTree>
+      <p:nvGrpSpPr>
+        <p:cNvPr id="1" name=""/>
+        <p:cNvGrpSpPr/>
+        <p:nvPr/>
+      </p:nvGrpSpPr>
+      <p:grpSpPr>
+        <a:xfrm>
+          <a:off x="0" y="0"/>
+          <a:ext cx="0" cy="0"/>
+          <a:chOff x="0" y="0"/>
+          <a:chExt cx="0" cy="0"/>
+        </a:xfrm>
+      </p:grpSpPr>
+      <p:sp>
+        <p:nvSpPr>
+          <p:cNvPr id="2" name="Content Placeholder 1"/>
+          <p:cNvSpPr>
+            <a:spLocks noGrp="1"/>
+          </p:cNvSpPr>
+          <p:nvPr>
+            <p:ph idx="1"/>
+          </p:nvPr>
+        </p:nvSpPr>
+        <p:spPr/>
+        <p:txBody>
+          <a:bodyPr>
+            <a:normAutofit/>
+          </a:bodyPr>
+          <a:lstStyle/>
+          <a:p>
+            <a:r>
+              <a:rPr lang="de-DE" sz="2200" dirty="0" smtClean="0">
                 <a:hlinkClick r:id="rId2"/>
               </a:rPr>
               <a:t>Dan Wahlin - AngularJS Fundamentals in 60-ish Minutes </a:t>
             </a:r>
             <a:r>
-              <a:rPr lang="de-DE" dirty="0" smtClean="0">
+              <a:rPr lang="de-DE" sz="2200" dirty="0" smtClean="0">
                 <a:hlinkClick r:id="rId2"/>
               </a:rPr>
               <a:t>Video</a:t>
             </a:r>
-            <a:endParaRPr lang="de-DE" dirty="0" smtClean="0"/>
-          </a:p>
-          <a:p>
-            <a:endParaRPr lang="de-DE" dirty="0" smtClean="0">
+            <a:endParaRPr lang="de-DE" sz="2200" dirty="0" smtClean="0"/>
+          </a:p>
+          <a:p>
+            <a:endParaRPr lang="de-DE" sz="1500" dirty="0" smtClean="0">
               <a:hlinkClick r:id="rId3"/>
             </a:endParaRPr>
           </a:p>
           <a:p>
             <a:r>
-              <a:rPr lang="de-DE" dirty="0" smtClean="0">
+              <a:rPr lang="de-DE" sz="2200" dirty="0" smtClean="0">
                 <a:hlinkClick r:id="rId3"/>
               </a:rPr>
-              <a:t>https</a:t>
-            </a:r>
-            <a:r>
-              <a:rPr lang="de-DE" dirty="0" smtClean="0">
-                <a:hlinkClick r:id="rId3"/>
-              </a:rPr>
-              <a:t>://</a:t>
-            </a:r>
-            <a:r>
-              <a:rPr lang="de-DE" dirty="0" smtClean="0">
+              <a:t>https://</a:t>
+            </a:r>
+            <a:r>
+              <a:rPr lang="de-DE" sz="2200" dirty="0" smtClean="0">
                 <a:hlinkClick r:id="rId3"/>
               </a:rPr>
               <a:t>egghead.io/technologies/angularjs</a:t>
             </a:r>
-            <a:endParaRPr lang="de-DE" dirty="0" smtClean="0"/>
-          </a:p>
-          <a:p>
-            <a:endParaRPr lang="en-US" dirty="0" smtClean="0">
-              <a:hlinkClick r:id="rId4"/>
-            </a:endParaRPr>
-          </a:p>
-          <a:p>
-            <a:r>
-              <a:rPr lang="en-US" dirty="0" err="1" smtClean="0">
+            <a:endParaRPr lang="de-DE" sz="2200" dirty="0" smtClean="0"/>
+          </a:p>
+          <a:p>
+            <a:endParaRPr lang="de-DE" sz="1500" dirty="0" smtClean="0"/>
+          </a:p>
+          <a:p>
+            <a:r>
+              <a:rPr lang="de-DE" sz="2200" dirty="0" smtClean="0">
                 <a:hlinkClick r:id="rId4"/>
               </a:rPr>
-              <a:t>AngularJS</a:t>
-            </a:r>
-            <a:r>
-              <a:rPr lang="en-US" dirty="0" smtClean="0">
+              <a:t>http://</a:t>
+            </a:r>
+            <a:r>
+              <a:rPr lang="de-DE" sz="2200" dirty="0" smtClean="0">
                 <a:hlinkClick r:id="rId4"/>
               </a:rPr>
+              <a:t>www.stackdriver.com/managing-missing-model-angular</a:t>
+            </a:r>
+            <a:endParaRPr lang="de-DE" sz="2200" dirty="0" smtClean="0"/>
+          </a:p>
+          <a:p>
+            <a:endParaRPr lang="de-DE" sz="1500" dirty="0" smtClean="0"/>
+          </a:p>
+          <a:p>
+            <a:r>
+              <a:rPr lang="de-DE" sz="2200" dirty="0" smtClean="0">
+                <a:hlinkClick r:id="rId5"/>
+              </a:rPr>
+              <a:t>http://</a:t>
+            </a:r>
+            <a:r>
+              <a:rPr lang="de-DE" sz="2200" dirty="0" smtClean="0">
+                <a:hlinkClick r:id="rId5"/>
+              </a:rPr>
+              <a:t>www.technofattie.com/2014/03/21/five-guidelines-for-avoiding-scope-soup-in-angular.html</a:t>
+            </a:r>
+            <a:endParaRPr lang="de-DE" sz="2200" dirty="0" smtClean="0"/>
+          </a:p>
+          <a:p>
+            <a:endParaRPr lang="en-US" sz="1500" dirty="0" smtClean="0">
+              <a:hlinkClick r:id="rId6"/>
+            </a:endParaRPr>
+          </a:p>
+          <a:p>
+            <a:r>
+              <a:rPr lang="en-US" dirty="0" err="1" smtClean="0">
+                <a:hlinkClick r:id="rId6"/>
+              </a:rPr>
+              <a:t>AngularJS</a:t>
+            </a:r>
+            <a:r>
+              <a:rPr lang="en-US" dirty="0" smtClean="0">
+                <a:hlinkClick r:id="rId6"/>
+              </a:rPr>
               <a:t> Yammer Group</a:t>
             </a:r>
             <a:endParaRPr lang="en-US" dirty="0" smtClean="0"/>
@@ -3324,7 +4013,7 @@
             <a:fld id="{24A51D8B-51BA-45F9-A651-4243A6A9861C}" type="slidenum">
               <a:rPr lang="en-US" smtClean="0"/>
               <a:pPr/>
-              <a:t>12</a:t>
+              <a:t>15</a:t>
             </a:fld>
             <a:endParaRPr lang="en-US" dirty="0"/>
           </a:p>
@@ -3509,7 +4198,7 @@
     </p:spTree>
     <p:extLst>
       <p:ext uri="{BB962C8B-B14F-4D97-AF65-F5344CB8AC3E}">
-        <p14:creationId xmlns="" xmlns:p14="http://schemas.microsoft.com/office/powerpoint/2010/main" val="1282900493"/>
+        <p14:creationId xmlns:p14="http://schemas.microsoft.com/office/powerpoint/2010/main" xmlns="" val="1282900493"/>
       </p:ext>
     </p:extLst>
   </p:cSld>
@@ -4188,11 +4877,7 @@
             </a:r>
             <a:r>
               <a:rPr lang="en-US" dirty="0" smtClean="0"/>
-              <a:t> </a:t>
-            </a:r>
-            <a:r>
-              <a:rPr lang="en-US" dirty="0" smtClean="0"/>
-              <a:t>/ Deep Linking</a:t>
+              <a:t> / Deep Linking</a:t>
             </a:r>
           </a:p>
           <a:p>
@@ -4581,13 +5266,8 @@
             </a:pPr>
             <a:r>
               <a:rPr lang="en-US" dirty="0" smtClean="0"/>
-              <a:t>Mature &amp; </a:t>
-            </a:r>
-            <a:r>
-              <a:rPr lang="en-US" dirty="0" smtClean="0"/>
-              <a:t>robust MVC framework</a:t>
-            </a:r>
-            <a:endParaRPr lang="en-US" dirty="0" smtClean="0"/>
+              <a:t>Mature &amp; robust MVC framework</a:t>
+            </a:r>
           </a:p>
           <a:p>
             <a:pPr>

</xml_diff>

<commit_message>
Finishing touches to slides and outline demo
</commit_message>
<xml_diff>
--- a/intro-to-angular-js.pptx
+++ b/intro-to-angular-js.pptx
@@ -376,7 +376,7 @@
     </p:spTree>
     <p:extLst>
       <p:ext uri="{BB962C8B-B14F-4D97-AF65-F5344CB8AC3E}">
-        <p14:creationId xmlns:p14="http://schemas.microsoft.com/office/powerpoint/2010/main" xmlns="" val="2181301"/>
+        <p14:creationId xmlns="" xmlns:p14="http://schemas.microsoft.com/office/powerpoint/2010/main" val="2181301"/>
       </p:ext>
     </p:extLst>
   </p:cSld>
@@ -2733,7 +2733,7 @@
     </p:spTree>
     <p:extLst>
       <p:ext uri="{BB962C8B-B14F-4D97-AF65-F5344CB8AC3E}">
-        <p14:creationId xmlns:p14="http://schemas.microsoft.com/office/powerpoint/2010/main" xmlns="" val="2379396099"/>
+        <p14:creationId xmlns="" xmlns:p14="http://schemas.microsoft.com/office/powerpoint/2010/main" val="2379396099"/>
       </p:ext>
     </p:extLst>
   </p:cSld>
@@ -3185,19 +3185,7 @@
             </a:pPr>
             <a:r>
               <a:rPr lang="en-US" sz="2400" i="1" dirty="0" smtClean="0"/>
-              <a:t>43,536 </a:t>
-            </a:r>
-            <a:r>
-              <a:rPr lang="en-US" sz="2400" i="1" dirty="0" smtClean="0"/>
-              <a:t>- C</a:t>
-            </a:r>
-            <a:r>
-              <a:rPr lang="en-US" sz="2400" i="1" dirty="0" smtClean="0"/>
-              <a:t>#/.</a:t>
-            </a:r>
-            <a:r>
-              <a:rPr lang="en-US" sz="2400" i="1" dirty="0" smtClean="0"/>
-              <a:t>NET</a:t>
+              <a:t>43,536 - C#/.NET</a:t>
             </a:r>
           </a:p>
           <a:p>
@@ -3402,11 +3390,7 @@
           <a:p>
             <a:r>
               <a:rPr lang="en-US" dirty="0" smtClean="0"/>
-              <a:t>Authentication/authorization </a:t>
-            </a:r>
-            <a:r>
-              <a:rPr lang="en-US" dirty="0" smtClean="0"/>
-              <a:t>via </a:t>
+              <a:t>Authentication/authorization via </a:t>
             </a:r>
             <a:r>
               <a:rPr lang="en-US" dirty="0" err="1" smtClean="0"/>
@@ -3418,11 +3402,7 @@
             <a:pPr lvl="1"/>
             <a:r>
               <a:rPr lang="en-US" sz="2200" dirty="0" smtClean="0"/>
-              <a:t>Solved with cookie based custom ASP.NET </a:t>
-            </a:r>
-            <a:r>
-              <a:rPr lang="en-US" sz="2200" dirty="0" smtClean="0"/>
-              <a:t>provider</a:t>
+              <a:t>Solved with cookie based custom ASP.NET provider</a:t>
             </a:r>
           </a:p>
           <a:p>
@@ -3436,11 +3416,7 @@
             </a:r>
             <a:r>
               <a:rPr lang="en-US" sz="2700" dirty="0" smtClean="0"/>
-              <a:t> framework – must implement your own “model</a:t>
-            </a:r>
-            <a:r>
-              <a:rPr lang="en-US" sz="2700" dirty="0" smtClean="0"/>
-              <a:t>”</a:t>
+              <a:t> framework – must implement your own “model”</a:t>
             </a:r>
           </a:p>
           <a:p>
@@ -3636,11 +3612,7 @@
           <a:p>
             <a:r>
               <a:rPr lang="en-US" sz="2700" dirty="0" smtClean="0"/>
-              <a:t>Avoid </a:t>
-            </a:r>
-            <a:r>
-              <a:rPr lang="en-US" sz="2700" dirty="0" smtClean="0"/>
-              <a:t>use of $scope inheritance</a:t>
+              <a:t>Avoid use of $scope inheritance</a:t>
             </a:r>
           </a:p>
           <a:p>
@@ -3835,13 +3807,7 @@
               <a:rPr lang="de-DE" sz="2200" dirty="0" smtClean="0">
                 <a:hlinkClick r:id="rId2"/>
               </a:rPr>
-              <a:t>Dan Wahlin - AngularJS Fundamentals in 60-ish Minutes </a:t>
-            </a:r>
-            <a:r>
-              <a:rPr lang="de-DE" sz="2200" dirty="0" smtClean="0">
-                <a:hlinkClick r:id="rId2"/>
-              </a:rPr>
-              <a:t>Video</a:t>
+              <a:t>Dan Wahlin - AngularJS Fundamentals in 60-ish Minutes Video</a:t>
             </a:r>
             <a:endParaRPr lang="de-DE" sz="2200" dirty="0" smtClean="0"/>
           </a:p>
@@ -3855,13 +3821,7 @@
               <a:rPr lang="de-DE" sz="2200" dirty="0" smtClean="0">
                 <a:hlinkClick r:id="rId3"/>
               </a:rPr>
-              <a:t>https://</a:t>
-            </a:r>
-            <a:r>
-              <a:rPr lang="de-DE" sz="2200" dirty="0" smtClean="0">
-                <a:hlinkClick r:id="rId3"/>
-              </a:rPr>
-              <a:t>egghead.io/technologies/angularjs</a:t>
+              <a:t>https://egghead.io/technologies/angularjs</a:t>
             </a:r>
             <a:endParaRPr lang="de-DE" sz="2200" dirty="0" smtClean="0"/>
           </a:p>
@@ -3873,13 +3833,7 @@
               <a:rPr lang="de-DE" sz="2200" dirty="0" smtClean="0">
                 <a:hlinkClick r:id="rId4"/>
               </a:rPr>
-              <a:t>http://</a:t>
-            </a:r>
-            <a:r>
-              <a:rPr lang="de-DE" sz="2200" dirty="0" smtClean="0">
-                <a:hlinkClick r:id="rId4"/>
-              </a:rPr>
-              <a:t>www.stackdriver.com/managing-missing-model-angular</a:t>
+              <a:t>http://www.stackdriver.com/managing-missing-model-angular</a:t>
             </a:r>
             <a:endParaRPr lang="de-DE" sz="2200" dirty="0" smtClean="0"/>
           </a:p>
@@ -3891,13 +3845,7 @@
               <a:rPr lang="de-DE" sz="2200" dirty="0" smtClean="0">
                 <a:hlinkClick r:id="rId5"/>
               </a:rPr>
-              <a:t>http://</a:t>
-            </a:r>
-            <a:r>
-              <a:rPr lang="de-DE" sz="2200" dirty="0" smtClean="0">
-                <a:hlinkClick r:id="rId5"/>
-              </a:rPr>
-              <a:t>www.technofattie.com/2014/03/21/five-guidelines-for-avoiding-scope-soup-in-angular.html</a:t>
+              <a:t>http://www.technofattie.com/2014/03/21/five-guidelines-for-avoiding-scope-soup-in-angular.html</a:t>
             </a:r>
             <a:endParaRPr lang="de-DE" sz="2200" dirty="0" smtClean="0"/>
           </a:p>
@@ -4198,7 +4146,7 @@
     </p:spTree>
     <p:extLst>
       <p:ext uri="{BB962C8B-B14F-4D97-AF65-F5344CB8AC3E}">
-        <p14:creationId xmlns:p14="http://schemas.microsoft.com/office/powerpoint/2010/main" xmlns="" val="1282900493"/>
+        <p14:creationId xmlns="" xmlns:p14="http://schemas.microsoft.com/office/powerpoint/2010/main" val="1282900493"/>
       </p:ext>
     </p:extLst>
   </p:cSld>
@@ -5105,8 +5053,8 @@
               </a:spcAft>
             </a:pPr>
             <a:r>
-              <a:rPr lang="en-US" dirty="0" err="1" smtClean="0"/>
-              <a:t>Extensability</a:t>
+              <a:rPr lang="en-US" dirty="0" smtClean="0"/>
+              <a:t>Extensibility</a:t>
             </a:r>
             <a:endParaRPr lang="en-US" dirty="0" smtClean="0"/>
           </a:p>

</xml_diff>